<commit_message>
update the methodology with the geo-location information
</commit_message>
<xml_diff>
--- a/DGA1031/What is it.pptx
+++ b/DGA1031/What is it.pptx
@@ -20,6 +20,7 @@
     <p:sldId id="263" r:id="rId14"/>
     <p:sldId id="270" r:id="rId15"/>
     <p:sldId id="264" r:id="rId16"/>
+    <p:sldId id="274" r:id="rId17"/>
   </p:sldIdLst>
   <p:sldSz cx="12192000" cy="6858000"/>
   <p:notesSz cx="6858000" cy="9144000"/>
@@ -120,7 +121,7 @@
   </p:defaultTextStyle>
   <p:extLst>
     <p:ext uri="{EFAFB233-063F-42B5-8137-9DF3F51BA10A}">
-      <p15:sldGuideLst xmlns:p15="http://schemas.microsoft.com/office/powerpoint/2012/main">
+      <p15:sldGuideLst xmlns:p15="http://schemas.microsoft.com/office/powerpoint/2012/main" xmlns="">
         <p15:guide id="1" orient="horz" pos="2160">
           <p15:clr>
             <a:srgbClr val="A4A3A4"/>
@@ -270,7 +271,7 @@
           <a:p>
             <a:fld id="{276D79ED-3FA7-4EF8-964B-EB8BCFAB02F8}" type="datetimeFigureOut">
               <a:rPr lang="en-US" smtClean="0"/>
-              <a:t>2/4/2018</a:t>
+              <a:t>05/02/2018</a:t>
             </a:fld>
             <a:endParaRPr lang="en-US"/>
           </a:p>
@@ -440,7 +441,7 @@
           <a:p>
             <a:fld id="{276D79ED-3FA7-4EF8-964B-EB8BCFAB02F8}" type="datetimeFigureOut">
               <a:rPr lang="en-US" smtClean="0"/>
-              <a:t>2/4/2018</a:t>
+              <a:t>05/02/2018</a:t>
             </a:fld>
             <a:endParaRPr lang="en-US"/>
           </a:p>
@@ -688,7 +689,7 @@
           <a:p>
             <a:fld id="{276D79ED-3FA7-4EF8-964B-EB8BCFAB02F8}" type="datetimeFigureOut">
               <a:rPr lang="en-US" smtClean="0"/>
-              <a:t>2/4/2018</a:t>
+              <a:t>05/02/2018</a:t>
             </a:fld>
             <a:endParaRPr lang="en-US"/>
           </a:p>
@@ -920,7 +921,7 @@
           <a:p>
             <a:fld id="{276D79ED-3FA7-4EF8-964B-EB8BCFAB02F8}" type="datetimeFigureOut">
               <a:rPr lang="en-US" smtClean="0"/>
-              <a:t>2/4/2018</a:t>
+              <a:t>05/02/2018</a:t>
             </a:fld>
             <a:endParaRPr lang="en-US"/>
           </a:p>
@@ -1287,7 +1288,7 @@
           <a:p>
             <a:fld id="{276D79ED-3FA7-4EF8-964B-EB8BCFAB02F8}" type="datetimeFigureOut">
               <a:rPr lang="en-US" smtClean="0"/>
-              <a:t>2/4/2018</a:t>
+              <a:t>05/02/2018</a:t>
             </a:fld>
             <a:endParaRPr lang="en-US"/>
           </a:p>
@@ -1405,7 +1406,7 @@
           <a:p>
             <a:fld id="{276D79ED-3FA7-4EF8-964B-EB8BCFAB02F8}" type="datetimeFigureOut">
               <a:rPr lang="en-US" smtClean="0"/>
-              <a:t>2/4/2018</a:t>
+              <a:t>05/02/2018</a:t>
             </a:fld>
             <a:endParaRPr lang="en-US"/>
           </a:p>
@@ -1500,7 +1501,7 @@
           <a:p>
             <a:fld id="{276D79ED-3FA7-4EF8-964B-EB8BCFAB02F8}" type="datetimeFigureOut">
               <a:rPr lang="en-US" smtClean="0"/>
-              <a:t>2/4/2018</a:t>
+              <a:t>05/02/2018</a:t>
             </a:fld>
             <a:endParaRPr lang="en-US"/>
           </a:p>
@@ -1777,7 +1778,7 @@
           <a:p>
             <a:fld id="{276D79ED-3FA7-4EF8-964B-EB8BCFAB02F8}" type="datetimeFigureOut">
               <a:rPr lang="en-US" smtClean="0"/>
-              <a:t>2/4/2018</a:t>
+              <a:t>05/02/2018</a:t>
             </a:fld>
             <a:endParaRPr lang="en-US"/>
           </a:p>
@@ -2034,7 +2035,7 @@
           <a:p>
             <a:fld id="{276D79ED-3FA7-4EF8-964B-EB8BCFAB02F8}" type="datetimeFigureOut">
               <a:rPr lang="en-US" smtClean="0"/>
-              <a:t>2/4/2018</a:t>
+              <a:t>05/02/2018</a:t>
             </a:fld>
             <a:endParaRPr lang="en-US"/>
           </a:p>
@@ -2255,7 +2256,7 @@
           <a:p>
             <a:fld id="{276D79ED-3FA7-4EF8-964B-EB8BCFAB02F8}" type="datetimeFigureOut">
               <a:rPr lang="en-US" smtClean="0"/>
-              <a:t>2/4/2018</a:t>
+              <a:t>05/02/2018</a:t>
             </a:fld>
             <a:endParaRPr lang="en-US"/>
           </a:p>
@@ -2846,7 +2847,18 @@
           <a:p>
             <a:r>
               <a:rPr lang="en-US" sz="2000" b="1" dirty="0" smtClean="0"/>
-              <a:t>Supervised by: Prof. Sylvie </a:t>
+              <a:t>Supervised by: </a:t>
+            </a:r>
+            <a:endParaRPr lang="en-US" sz="2000" b="1" dirty="0" smtClean="0"/>
+          </a:p>
+          <a:p>
+            <a:r>
+              <a:rPr lang="en-US" sz="2000" b="1" dirty="0" smtClean="0"/>
+              <a:t>Prof</a:t>
+            </a:r>
+            <a:r>
+              <a:rPr lang="en-US" sz="2000" b="1" dirty="0" smtClean="0"/>
+              <a:t>. Sylvie </a:t>
             </a:r>
             <a:r>
               <a:rPr lang="en-US" sz="2000" b="1" dirty="0" err="1" smtClean="0"/>
@@ -2948,11 +2960,7 @@
             </a:pPr>
             <a:r>
               <a:rPr lang="en-US" sz="2400" dirty="0" smtClean="0"/>
-              <a:t>Identify and recognize the object with the “private feature” of artwork, </a:t>
-            </a:r>
-            <a:r>
-              <a:rPr lang="en-US" sz="2400" dirty="0" smtClean="0"/>
-              <a:t>specimen, whatever</a:t>
+              <a:t>Identify and recognize the object with the “private feature” of artwork, specimen, whatever</a:t>
             </a:r>
           </a:p>
           <a:p>
@@ -2963,15 +2971,7 @@
             </a:pPr>
             <a:r>
               <a:rPr lang="en-US" sz="2400" dirty="0" smtClean="0"/>
-              <a:t>Faster </a:t>
-            </a:r>
-            <a:r>
-              <a:rPr lang="en-US" sz="2400" dirty="0" smtClean="0"/>
-              <a:t>handling of responding for real time used </a:t>
-            </a:r>
-            <a:r>
-              <a:rPr lang="en-US" sz="2400" dirty="0" smtClean="0"/>
-              <a:t>cases</a:t>
+              <a:t>Faster handling of responding for real time used cases</a:t>
             </a:r>
           </a:p>
           <a:p>
@@ -2990,13 +2990,8 @@
             </a:r>
             <a:r>
               <a:rPr lang="en-US" sz="2400" dirty="0" smtClean="0"/>
-              <a:t>real time </a:t>
-            </a:r>
-            <a:r>
-              <a:rPr lang="en-US" sz="2400" dirty="0" smtClean="0"/>
-              <a:t>applications</a:t>
-            </a:r>
-            <a:endParaRPr lang="en-US" sz="2400" dirty="0" smtClean="0"/>
+              <a:t>real time applications</a:t>
+            </a:r>
           </a:p>
           <a:p>
             <a:pPr algn="just">
@@ -3656,7 +3651,12 @@
             <p:ph idx="1"/>
           </p:nvPr>
         </p:nvSpPr>
-        <p:spPr/>
+        <p:spPr>
+          <a:xfrm>
+            <a:off x="3095897" y="1609859"/>
+            <a:ext cx="8623663" cy="4855335"/>
+          </a:xfrm>
+        </p:spPr>
         <p:txBody>
           <a:bodyPr>
             <a:noAutofit/>
@@ -3665,45 +3665,104 @@
           <a:p>
             <a:pPr algn="just"/>
             <a:r>
-              <a:rPr lang="en-US" sz="2000" dirty="0" smtClean="0"/>
-              <a:t>Exploit the Artificial, Deep, Recurrent, Convolutional neural networks (ANN,DNN, RNN,CNN), Supervised, Unsupervised, and Deep reinforcement learning, search engine algorithm to improve the quality of object recognition.</a:t>
-            </a:r>
-          </a:p>
-          <a:p>
-            <a:pPr marL="0" indent="0" algn="just">
-              <a:buNone/>
-            </a:pPr>
-            <a:endParaRPr lang="en-US" sz="2000" dirty="0" smtClean="0"/>
+              <a:rPr lang="en-US" sz="1800" dirty="0" smtClean="0"/>
+              <a:t>Exploit the Artificial, Deep, Recurrent, Convolutional neural networks (</a:t>
+            </a:r>
+            <a:r>
+              <a:rPr lang="en-US" sz="1800" dirty="0" smtClean="0"/>
+              <a:t>ANN,DNN,RNN,CNN</a:t>
+            </a:r>
+            <a:r>
+              <a:rPr lang="en-US" sz="1800" dirty="0" smtClean="0"/>
+              <a:t>), Supervised, Unsupervised, and Deep </a:t>
+            </a:r>
+            <a:r>
+              <a:rPr lang="en-US" sz="1800" dirty="0" smtClean="0"/>
+              <a:t>Reinforcement </a:t>
+            </a:r>
+            <a:r>
+              <a:rPr lang="en-US" sz="1800" dirty="0" smtClean="0"/>
+              <a:t>learning, </a:t>
+            </a:r>
+            <a:r>
+              <a:rPr lang="en-US" sz="1800" dirty="0" smtClean="0"/>
+              <a:t>Search Engine </a:t>
+            </a:r>
+            <a:r>
+              <a:rPr lang="en-US" sz="1800" dirty="0" smtClean="0"/>
+              <a:t>algorithm to improve the quality of object recognition</a:t>
+            </a:r>
+            <a:r>
+              <a:rPr lang="en-US" sz="1800" dirty="0" smtClean="0"/>
+              <a:t>.</a:t>
+            </a:r>
           </a:p>
           <a:p>
             <a:pPr algn="just"/>
             <a:r>
-              <a:rPr lang="en-US" sz="2000" dirty="0" smtClean="0"/>
-              <a:t>Build-up machine learning algorithms and artificial intelligence in order to recognize, analyze and make the explanation of a given object by using smartphone camera.</a:t>
-            </a:r>
+              <a:rPr lang="en-US" sz="1800" dirty="0" smtClean="0"/>
+              <a:t>Generate the Holographic, Virtual and </a:t>
+            </a:r>
+            <a:r>
+              <a:rPr lang="en-US" sz="1800" dirty="0"/>
+              <a:t>Augmented </a:t>
+            </a:r>
+            <a:r>
+              <a:rPr lang="en-US" sz="1800" dirty="0" smtClean="0"/>
+              <a:t>reality to make an impressive and efficient visual item</a:t>
+            </a:r>
+            <a:endParaRPr lang="en-US" sz="1800" dirty="0" smtClean="0"/>
           </a:p>
           <a:p>
             <a:pPr algn="just"/>
-            <a:endParaRPr lang="en-US" sz="2000" dirty="0"/>
+            <a:r>
+              <a:rPr lang="en-US" sz="1800" dirty="0" smtClean="0"/>
+              <a:t>Apply a natural language user interface to attempt to answer questions, make recommendation, and perform actions by delegating requests to a set of Internet services</a:t>
+            </a:r>
           </a:p>
           <a:p>
             <a:pPr algn="just"/>
             <a:r>
-              <a:rPr lang="en-US" sz="2000" dirty="0" smtClean="0"/>
-              <a:t>Make the approximated verification method to confirm the accuracy of generated information </a:t>
+              <a:rPr lang="en-US" sz="1800" dirty="0" smtClean="0"/>
+              <a:t>Build-up </a:t>
+            </a:r>
+            <a:r>
+              <a:rPr lang="en-US" sz="1800" dirty="0" smtClean="0"/>
+              <a:t>machine learning algorithms and artificial intelligence in order to recognize, analyze and make the explanation of a given object by using smartphone camera</a:t>
+            </a:r>
+            <a:r>
+              <a:rPr lang="en-US" sz="1800" dirty="0" smtClean="0"/>
+              <a:t>.</a:t>
             </a:r>
           </a:p>
           <a:p>
             <a:pPr algn="just"/>
-            <a:endParaRPr lang="en-US" sz="2000" dirty="0" smtClean="0"/>
+            <a:r>
+              <a:rPr lang="en-US" sz="1800" dirty="0" smtClean="0"/>
+              <a:t>Optimizing and improving the performance of system by considering the boundary geolocation of items </a:t>
+            </a:r>
           </a:p>
           <a:p>
             <a:pPr algn="just"/>
             <a:r>
-              <a:rPr lang="en-US" sz="2000" dirty="0" smtClean="0"/>
-              <a:t>Update the knowledge of the system based on the users’ contributions</a:t>
-            </a:r>
-            <a:endParaRPr lang="en-US" sz="2000" dirty="0" smtClean="0"/>
+              <a:rPr lang="en-US" sz="1800" dirty="0" smtClean="0"/>
+              <a:t>Make </a:t>
+            </a:r>
+            <a:r>
+              <a:rPr lang="en-US" sz="1800" dirty="0" smtClean="0"/>
+              <a:t>the approximated verification method to confirm the accuracy of generated information </a:t>
+            </a:r>
+          </a:p>
+          <a:p>
+            <a:pPr algn="just"/>
+            <a:r>
+              <a:rPr lang="en-US" sz="1800" dirty="0" smtClean="0"/>
+              <a:t>Update </a:t>
+            </a:r>
+            <a:r>
+              <a:rPr lang="en-US" sz="1800" dirty="0" smtClean="0"/>
+              <a:t>the knowledge of the system based on the users’ contributions</a:t>
+            </a:r>
           </a:p>
         </p:txBody>
       </p:sp>
@@ -5558,6 +5617,64 @@
 </p:sld>
 </file>
 
+<file path=ppt/slides/slide16.xml><?xml version="1.0" encoding="utf-8"?>
+<p:sld xmlns:a="http://schemas.openxmlformats.org/drawingml/2006/main" xmlns:r="http://schemas.openxmlformats.org/officeDocument/2006/relationships" xmlns:p="http://schemas.openxmlformats.org/presentationml/2006/main">
+  <p:cSld>
+    <p:spTree>
+      <p:nvGrpSpPr>
+        <p:cNvPr id="1" name=""/>
+        <p:cNvGrpSpPr/>
+        <p:nvPr/>
+      </p:nvGrpSpPr>
+      <p:grpSpPr>
+        <a:xfrm>
+          <a:off x="0" y="0"/>
+          <a:ext cx="0" cy="0"/>
+          <a:chOff x="0" y="0"/>
+          <a:chExt cx="0" cy="0"/>
+        </a:xfrm>
+      </p:grpSpPr>
+      <p:sp>
+        <p:nvSpPr>
+          <p:cNvPr id="4" name="Title 3"/>
+          <p:cNvSpPr>
+            <a:spLocks noGrp="1"/>
+          </p:cNvSpPr>
+          <p:nvPr>
+            <p:ph type="title"/>
+          </p:nvPr>
+        </p:nvSpPr>
+        <p:spPr>
+          <a:xfrm>
+            <a:off x="3198928" y="2890119"/>
+            <a:ext cx="7876903" cy="1325563"/>
+          </a:xfrm>
+        </p:spPr>
+        <p:txBody>
+          <a:bodyPr/>
+          <a:lstStyle/>
+          <a:p>
+            <a:r>
+              <a:rPr lang="en-US" dirty="0" smtClean="0"/>
+              <a:t>Thank you</a:t>
+            </a:r>
+            <a:endParaRPr lang="en-US" dirty="0"/>
+          </a:p>
+        </p:txBody>
+      </p:sp>
+    </p:spTree>
+    <p:extLst>
+      <p:ext uri="{BB962C8B-B14F-4D97-AF65-F5344CB8AC3E}">
+        <p14:creationId xmlns:p14="http://schemas.microsoft.com/office/powerpoint/2010/main" val="2984033562"/>
+      </p:ext>
+    </p:extLst>
+  </p:cSld>
+  <p:clrMapOvr>
+    <a:masterClrMapping/>
+  </p:clrMapOvr>
+</p:sld>
+</file>
+
 <file path=ppt/slides/slide2.xml><?xml version="1.0" encoding="utf-8"?>
 <p:sld xmlns:a="http://schemas.openxmlformats.org/drawingml/2006/main" xmlns:r="http://schemas.openxmlformats.org/officeDocument/2006/relationships" xmlns:p="http://schemas.openxmlformats.org/presentationml/2006/main" showMasterSp="0">
   <p:cSld>
@@ -6964,11 +7081,7 @@
             </a:r>
             <a:r>
               <a:rPr lang="en-US" sz="1800" dirty="0" smtClean="0"/>
-              <a:t>) is an important research area for manipulating large multimedia databases and digital library characterized by automatic indexing of images based on their own visual features, CBIR uses featured include [1] color, texture, shape, and edge </a:t>
-            </a:r>
-            <a:r>
-              <a:rPr lang="en-US" sz="1800" dirty="0" smtClean="0"/>
-              <a:t>information</a:t>
+              <a:t>) is an important research area for manipulating large multimedia databases and digital library characterized by automatic indexing of images based on their own visual features, CBIR uses featured include [1] color, texture, shape, and edge information</a:t>
             </a:r>
           </a:p>
           <a:p>
@@ -7854,11 +7967,7 @@
             </a:r>
             <a:r>
               <a:rPr lang="en-US" sz="1100" dirty="0" smtClean="0"/>
-              <a:t>Springer, 2014, pp. </a:t>
-            </a:r>
-            <a:r>
-              <a:rPr lang="en-US" sz="1100" dirty="0" smtClean="0"/>
-              <a:t>818-833</a:t>
+              <a:t>Springer, 2014, pp. 818-833</a:t>
             </a:r>
           </a:p>
           <a:p>
@@ -7920,7 +8029,6 @@
               <a:rPr lang="en-US" sz="1100" dirty="0" smtClean="0"/>
               <a:t>, “A Comparative Study of Content Based Image Retrieval Trends and Approaches”, in International Journal of Image Processing (IJIP), Vol. 9: Issue 3, 2015, pp. 127–155.</a:t>
             </a:r>
-            <a:endParaRPr lang="en-US" sz="1100" dirty="0" smtClean="0"/>
           </a:p>
           <a:p>
             <a:r>
@@ -7935,7 +8043,6 @@
               <a:rPr lang="en-US" sz="1100" dirty="0" smtClean="0"/>
               <a:t>, “ A Review on CBIR with its Advantages and Disadvantages for Low-level Features”, in International Journal of Computer Sciences and Engineering, Vol : Issue 7, 2016, pp. 161- 167</a:t>
             </a:r>
-            <a:endParaRPr lang="en-US" sz="1100" dirty="0" smtClean="0"/>
           </a:p>
         </p:txBody>
       </p:sp>
@@ -8383,7 +8490,7 @@
   <a:extraClrSchemeLst/>
   <a:extLst>
     <a:ext uri="{05A4C25C-085E-4340-85A3-A5531E510DB2}">
-      <thm15:themeFamily xmlns:thm15="http://schemas.microsoft.com/office/thememl/2012/main" name="Presentation8" id="{DABEB7E4-FBD7-C94F-9D7C-453E867EFB64}" vid="{9B141126-495E-6545-A756-93C48DDBAC65}"/>
+      <thm15:themeFamily xmlns:thm15="http://schemas.microsoft.com/office/thememl/2012/main" xmlns="" name="Presentation8" id="{DABEB7E4-FBD7-C94F-9D7C-453E867EFB64}" vid="{9B141126-495E-6545-A756-93C48DDBAC65}"/>
     </a:ext>
   </a:extLst>
 </a:theme>

</xml_diff>

<commit_message>
preparation of meeting with Ronald and Apo
</commit_message>
<xml_diff>
--- a/DGA1031/What is it.pptx
+++ b/DGA1031/What is it.pptx
@@ -277,7 +277,7 @@
           <a:p>
             <a:fld id="{276D79ED-3FA7-4EF8-964B-EB8BCFAB02F8}" type="datetimeFigureOut">
               <a:rPr lang="en-US" smtClean="0"/>
-              <a:t>2/18/2018</a:t>
+              <a:t>2/21/2018</a:t>
             </a:fld>
             <a:endParaRPr lang="en-US"/>
           </a:p>
@@ -447,7 +447,7 @@
           <a:p>
             <a:fld id="{276D79ED-3FA7-4EF8-964B-EB8BCFAB02F8}" type="datetimeFigureOut">
               <a:rPr lang="en-US" smtClean="0"/>
-              <a:t>2/18/2018</a:t>
+              <a:t>2/21/2018</a:t>
             </a:fld>
             <a:endParaRPr lang="en-US"/>
           </a:p>
@@ -695,7 +695,7 @@
           <a:p>
             <a:fld id="{276D79ED-3FA7-4EF8-964B-EB8BCFAB02F8}" type="datetimeFigureOut">
               <a:rPr lang="en-US" smtClean="0"/>
-              <a:t>2/18/2018</a:t>
+              <a:t>2/21/2018</a:t>
             </a:fld>
             <a:endParaRPr lang="en-US"/>
           </a:p>
@@ -927,7 +927,7 @@
           <a:p>
             <a:fld id="{276D79ED-3FA7-4EF8-964B-EB8BCFAB02F8}" type="datetimeFigureOut">
               <a:rPr lang="en-US" smtClean="0"/>
-              <a:t>2/18/2018</a:t>
+              <a:t>2/21/2018</a:t>
             </a:fld>
             <a:endParaRPr lang="en-US"/>
           </a:p>
@@ -1294,7 +1294,7 @@
           <a:p>
             <a:fld id="{276D79ED-3FA7-4EF8-964B-EB8BCFAB02F8}" type="datetimeFigureOut">
               <a:rPr lang="en-US" smtClean="0"/>
-              <a:t>2/18/2018</a:t>
+              <a:t>2/21/2018</a:t>
             </a:fld>
             <a:endParaRPr lang="en-US"/>
           </a:p>
@@ -1412,7 +1412,7 @@
           <a:p>
             <a:fld id="{276D79ED-3FA7-4EF8-964B-EB8BCFAB02F8}" type="datetimeFigureOut">
               <a:rPr lang="en-US" smtClean="0"/>
-              <a:t>2/18/2018</a:t>
+              <a:t>2/21/2018</a:t>
             </a:fld>
             <a:endParaRPr lang="en-US"/>
           </a:p>
@@ -1507,7 +1507,7 @@
           <a:p>
             <a:fld id="{276D79ED-3FA7-4EF8-964B-EB8BCFAB02F8}" type="datetimeFigureOut">
               <a:rPr lang="en-US" smtClean="0"/>
-              <a:t>2/18/2018</a:t>
+              <a:t>2/21/2018</a:t>
             </a:fld>
             <a:endParaRPr lang="en-US"/>
           </a:p>
@@ -1784,7 +1784,7 @@
           <a:p>
             <a:fld id="{276D79ED-3FA7-4EF8-964B-EB8BCFAB02F8}" type="datetimeFigureOut">
               <a:rPr lang="en-US" smtClean="0"/>
-              <a:t>2/18/2018</a:t>
+              <a:t>2/21/2018</a:t>
             </a:fld>
             <a:endParaRPr lang="en-US"/>
           </a:p>
@@ -2041,7 +2041,7 @@
           <a:p>
             <a:fld id="{276D79ED-3FA7-4EF8-964B-EB8BCFAB02F8}" type="datetimeFigureOut">
               <a:rPr lang="en-US" smtClean="0"/>
-              <a:t>2/18/2018</a:t>
+              <a:t>2/21/2018</a:t>
             </a:fld>
             <a:endParaRPr lang="en-US"/>
           </a:p>
@@ -2262,7 +2262,7 @@
           <a:p>
             <a:fld id="{276D79ED-3FA7-4EF8-964B-EB8BCFAB02F8}" type="datetimeFigureOut">
               <a:rPr lang="en-US" smtClean="0"/>
-              <a:t>2/18/2018</a:t>
+              <a:t>2/21/2018</a:t>
             </a:fld>
             <a:endParaRPr lang="en-US"/>
           </a:p>
@@ -2813,7 +2813,11 @@
             </a:br>
             <a:r>
               <a:rPr lang="en-US" dirty="0" smtClean="0"/>
-              <a:t>What is it?</a:t>
+              <a:t>What is </a:t>
+            </a:r>
+            <a:r>
+              <a:rPr lang="en-US" dirty="0" smtClean="0"/>
+              <a:t>it (WIT) ?</a:t>
             </a:r>
             <a:endParaRPr lang="en-US" dirty="0"/>
           </a:p>
@@ -2873,6 +2877,9 @@
               <a:rPr lang="en-US" sz="2000" b="1" dirty="0" err="1" smtClean="0"/>
               <a:t>Brisebois</a:t>
             </a:r>
+            <a:endParaRPr lang="en-US" sz="2000" b="1" dirty="0" smtClean="0"/>
+          </a:p>
+          <a:p>
             <a:endParaRPr lang="en-US" sz="2000" b="1" dirty="0" smtClean="0"/>
           </a:p>
         </p:txBody>
@@ -2922,8 +2929,8 @@
         </p:nvSpPr>
         <p:spPr>
           <a:xfrm>
-            <a:off x="4415480" y="1000125"/>
-            <a:ext cx="2883244" cy="1713470"/>
+            <a:off x="3161654" y="1000125"/>
+            <a:ext cx="4137070" cy="1713470"/>
           </a:xfrm>
           <a:prstGeom prst="wedgeRectCallout">
             <a:avLst>
@@ -2951,7 +2958,7 @@
           <a:lstStyle/>
           <a:p>
             <a:r>
-              <a:rPr lang="en-US" sz="1600" dirty="0" smtClean="0"/>
+              <a:rPr lang="en-US" sz="1600" b="1" dirty="0" smtClean="0"/>
               <a:t>Original feature information:</a:t>
             </a:r>
           </a:p>
@@ -3053,6 +3060,77 @@
               <a:rPr lang="en-US" sz="1100" dirty="0"/>
               <a:t>https://en.wikipedia.org/wiki/Mona_Lisa</a:t>
             </a:r>
+          </a:p>
+        </p:txBody>
+      </p:sp>
+      <p:sp>
+        <p:nvSpPr>
+          <p:cNvPr id="7" name="Round Diagonal Corner Rectangle 6"/>
+          <p:cNvSpPr/>
+          <p:nvPr/>
+        </p:nvSpPr>
+        <p:spPr>
+          <a:xfrm>
+            <a:off x="2918025" y="3358834"/>
+            <a:ext cx="4624327" cy="1723759"/>
+          </a:xfrm>
+          <a:prstGeom prst="round2DiagRect">
+            <a:avLst/>
+          </a:prstGeom>
+        </p:spPr>
+        <p:style>
+          <a:lnRef idx="2">
+            <a:schemeClr val="dk1"/>
+          </a:lnRef>
+          <a:fillRef idx="1">
+            <a:schemeClr val="lt1"/>
+          </a:fillRef>
+          <a:effectRef idx="0">
+            <a:schemeClr val="dk1"/>
+          </a:effectRef>
+          <a:fontRef idx="minor">
+            <a:schemeClr val="dk1"/>
+          </a:fontRef>
+        </p:style>
+        <p:txBody>
+          <a:bodyPr rtlCol="0" anchor="ctr"/>
+          <a:lstStyle/>
+          <a:p>
+            <a:r>
+              <a:rPr lang="en-US" b="1" dirty="0"/>
+              <a:t>Limitation:</a:t>
+            </a:r>
+          </a:p>
+          <a:p>
+            <a:r>
+              <a:rPr lang="en-US" dirty="0"/>
+              <a:t>+ Performance: time </a:t>
+            </a:r>
+            <a:r>
+              <a:rPr lang="en-US" dirty="0" smtClean="0"/>
+              <a:t>response</a:t>
+            </a:r>
+          </a:p>
+          <a:p>
+            <a:r>
+              <a:rPr lang="en-US" dirty="0" smtClean="0"/>
+              <a:t>+ Accuracy: Detect the general object (e.g., a car, person, tree, etc.,)</a:t>
+            </a:r>
+          </a:p>
+          <a:p>
+            <a:r>
+              <a:rPr lang="en-US" dirty="0" smtClean="0"/>
+              <a:t>+ </a:t>
+            </a:r>
+            <a:r>
+              <a:rPr lang="en-US" dirty="0"/>
+              <a:t>Display information without </a:t>
+            </a:r>
+            <a:r>
+              <a:rPr lang="en-US" dirty="0" smtClean="0"/>
+              <a:t>visualizing</a:t>
+            </a:r>
+            <a:endParaRPr lang="en-US" dirty="0"/>
           </a:p>
         </p:txBody>
       </p:sp>
@@ -3121,8 +3199,8 @@
         </p:nvSpPr>
         <p:spPr>
           <a:xfrm>
-            <a:off x="3095897" y="1584960"/>
-            <a:ext cx="8623663" cy="4644254"/>
+            <a:off x="3095896" y="1430448"/>
+            <a:ext cx="8623663" cy="4956745"/>
           </a:xfrm>
         </p:spPr>
         <p:txBody>
@@ -3137,8 +3215,20 @@
               </a:lnSpc>
             </a:pPr>
             <a:r>
-              <a:rPr lang="en-US" sz="1200" dirty="0" smtClean="0"/>
-              <a:t>Identify and recognize the object with the “private feature” of artwork, specimen, whatever</a:t>
+              <a:rPr lang="en-US" sz="1100" dirty="0" smtClean="0"/>
+              <a:t>Identify and recognize the object with the </a:t>
+            </a:r>
+            <a:r>
+              <a:rPr lang="en-US" sz="1100" b="1" dirty="0" smtClean="0">
+                <a:solidFill>
+                  <a:srgbClr val="0070C0"/>
+                </a:solidFill>
+              </a:rPr>
+              <a:t>“private feature” </a:t>
+            </a:r>
+            <a:r>
+              <a:rPr lang="en-US" sz="1100" dirty="0" smtClean="0"/>
+              <a:t>of artwork, specimen, whatever</a:t>
             </a:r>
           </a:p>
           <a:p>
@@ -3148,8 +3238,20 @@
               </a:lnSpc>
             </a:pPr>
             <a:r>
-              <a:rPr lang="en-US" sz="1200" dirty="0" smtClean="0"/>
-              <a:t>Faster handling of responding for real time used cases</a:t>
+              <a:rPr lang="en-US" sz="1100" dirty="0" smtClean="0"/>
+              <a:t>Faster handling of responding for </a:t>
+            </a:r>
+            <a:r>
+              <a:rPr lang="en-US" sz="1100" dirty="0" smtClean="0">
+                <a:solidFill>
+                  <a:srgbClr val="FF0000"/>
+                </a:solidFill>
+              </a:rPr>
+              <a:t>real time </a:t>
+            </a:r>
+            <a:r>
+              <a:rPr lang="en-US" sz="1100" dirty="0" smtClean="0"/>
+              <a:t>used cases</a:t>
             </a:r>
           </a:p>
           <a:p>
@@ -3159,15 +3261,25 @@
               </a:lnSpc>
             </a:pPr>
             <a:r>
-              <a:rPr lang="en-US" sz="1200" dirty="0" smtClean="0"/>
+              <a:rPr lang="en-US" sz="1100" dirty="0" smtClean="0"/>
               <a:t>Data </a:t>
             </a:r>
             <a:r>
-              <a:rPr lang="en-US" sz="1200" dirty="0"/>
-              <a:t>authenticity, confidentiality, ready, and integrity for </a:t>
-            </a:r>
-            <a:r>
-              <a:rPr lang="en-US" sz="1200" dirty="0" smtClean="0"/>
+              <a:rPr lang="en-US" sz="1100" dirty="0">
+                <a:solidFill>
+                  <a:schemeClr val="accent2">
+                    <a:lumMod val="75000"/>
+                  </a:schemeClr>
+                </a:solidFill>
+              </a:rPr>
+              <a:t>authenticity, confidentiality, ready, and integrity </a:t>
+            </a:r>
+            <a:r>
+              <a:rPr lang="en-US" sz="1100" dirty="0"/>
+              <a:t>for </a:t>
+            </a:r>
+            <a:r>
+              <a:rPr lang="en-US" sz="1100" dirty="0" smtClean="0"/>
               <a:t>real time applications</a:t>
             </a:r>
           </a:p>
@@ -3178,12 +3290,24 @@
               </a:lnSpc>
             </a:pPr>
             <a:r>
-              <a:rPr lang="en-US" sz="1200" dirty="0" smtClean="0"/>
+              <a:rPr lang="en-US" sz="1100" dirty="0" smtClean="0"/>
               <a:t>The </a:t>
             </a:r>
             <a:r>
-              <a:rPr lang="en-US" sz="1200" dirty="0"/>
-              <a:t>expectation of users for huge amount of objects to search among</a:t>
+              <a:rPr lang="en-US" sz="1100" dirty="0"/>
+              <a:t>expectation of users </a:t>
+            </a:r>
+            <a:r>
+              <a:rPr lang="en-US" sz="1100" dirty="0">
+                <a:solidFill>
+                  <a:srgbClr val="C00000"/>
+                </a:solidFill>
+              </a:rPr>
+              <a:t>for huge amount of objects </a:t>
+            </a:r>
+            <a:r>
+              <a:rPr lang="en-US" sz="1100" dirty="0"/>
+              <a:t>to search among</a:t>
             </a:r>
           </a:p>
           <a:p>
@@ -3193,12 +3317,20 @@
               </a:lnSpc>
             </a:pPr>
             <a:r>
-              <a:rPr lang="en-US" sz="1200" dirty="0" smtClean="0"/>
+              <a:rPr lang="en-US" sz="1100" dirty="0" smtClean="0"/>
               <a:t>Sometimes </a:t>
             </a:r>
             <a:r>
-              <a:rPr lang="en-US" sz="1200" dirty="0"/>
-              <a:t>incompleteness query specification seems to be a challenge</a:t>
+              <a:rPr lang="en-US" sz="1100" dirty="0">
+                <a:solidFill>
+                  <a:srgbClr val="00B0F0"/>
+                </a:solidFill>
+              </a:rPr>
+              <a:t>incompleteness query specification </a:t>
+            </a:r>
+            <a:r>
+              <a:rPr lang="en-US" sz="1100" dirty="0"/>
+              <a:t>seems to be a challenge</a:t>
             </a:r>
           </a:p>
           <a:p>
@@ -3208,23 +3340,35 @@
               </a:lnSpc>
             </a:pPr>
             <a:r>
-              <a:rPr lang="en-US" sz="1200" dirty="0" smtClean="0"/>
+              <a:rPr lang="en-US" sz="1100" dirty="0" smtClean="0">
+                <a:solidFill>
+                  <a:srgbClr val="FF0000"/>
+                </a:solidFill>
+              </a:rPr>
               <a:t>Incomplete </a:t>
             </a:r>
             <a:r>
-              <a:rPr lang="en-US" sz="1200" dirty="0"/>
-              <a:t>image description is also a </a:t>
-            </a:r>
-            <a:r>
-              <a:rPr lang="en-US" sz="1200" dirty="0" smtClean="0"/>
+              <a:rPr lang="en-US" sz="1100" dirty="0">
+                <a:solidFill>
+                  <a:srgbClr val="FF0000"/>
+                </a:solidFill>
+              </a:rPr>
+              <a:t>image </a:t>
+            </a:r>
+            <a:r>
+              <a:rPr lang="en-US" sz="1100" dirty="0"/>
+              <a:t>description is also a </a:t>
+            </a:r>
+            <a:r>
+              <a:rPr lang="en-US" sz="1100" dirty="0" smtClean="0"/>
               <a:t>source </a:t>
             </a:r>
             <a:r>
-              <a:rPr lang="en-US" sz="1200" dirty="0"/>
+              <a:rPr lang="en-US" sz="1100" dirty="0"/>
               <a:t>of challenge to an efficient CBIR </a:t>
             </a:r>
             <a:r>
-              <a:rPr lang="en-US" sz="1200" dirty="0" smtClean="0"/>
+              <a:rPr lang="en-US" sz="1100" dirty="0" smtClean="0"/>
               <a:t>system</a:t>
             </a:r>
           </a:p>
@@ -3235,8 +3379,20 @@
               </a:lnSpc>
             </a:pPr>
             <a:r>
-              <a:rPr lang="en-US" sz="1200" dirty="0" smtClean="0"/>
-              <a:t>The issue related to the semantic gap where it means the lack of coincidence between information that the same data have for a user in a given situation</a:t>
+              <a:rPr lang="en-US" sz="1100" dirty="0" smtClean="0"/>
+              <a:t>The issue related to the semantic gap where it means </a:t>
+            </a:r>
+            <a:r>
+              <a:rPr lang="en-US" sz="1100" dirty="0" smtClean="0">
+                <a:solidFill>
+                  <a:srgbClr val="00B050"/>
+                </a:solidFill>
+              </a:rPr>
+              <a:t>the lack of coincidence </a:t>
+            </a:r>
+            <a:r>
+              <a:rPr lang="en-US" sz="1100" dirty="0" smtClean="0"/>
+              <a:t>between information that the same data have for a user in a given situation</a:t>
             </a:r>
           </a:p>
           <a:p>
@@ -3246,11 +3402,19 @@
               </a:lnSpc>
             </a:pPr>
             <a:r>
-              <a:rPr lang="en-US" sz="1200" dirty="0"/>
-              <a:t>Updating meta-data based on the collected information from each node ( user</a:t>
-            </a:r>
-            <a:r>
-              <a:rPr lang="en-US" sz="1200" dirty="0" smtClean="0"/>
+              <a:rPr lang="en-US" sz="1100" dirty="0">
+                <a:solidFill>
+                  <a:srgbClr val="0070C0"/>
+                </a:solidFill>
+              </a:rPr>
+              <a:t>Updating meta-data</a:t>
+            </a:r>
+            <a:r>
+              <a:rPr lang="en-US" sz="1100" dirty="0"/>
+              <a:t> based on the collected information from each node ( user</a:t>
+            </a:r>
+            <a:r>
+              <a:rPr lang="en-US" sz="1100" dirty="0" smtClean="0"/>
               <a:t>)</a:t>
             </a:r>
           </a:p>
@@ -3261,13 +3425,14 @@
               </a:lnSpc>
             </a:pPr>
             <a:r>
-              <a:rPr lang="en-US" sz="1200" dirty="0"/>
-              <a:t>How to recognize the object with any angle direction </a:t>
-            </a:r>
-            <a:r>
-              <a:rPr lang="en-US" sz="1200" dirty="0" smtClean="0"/>
-              <a:t>of user’s view?</a:t>
-            </a:r>
+              <a:rPr lang="en-US" sz="1100" dirty="0" smtClean="0"/>
+              <a:t>How to recognize the object with its’ </a:t>
+            </a:r>
+            <a:r>
+              <a:rPr lang="en-US" sz="1100" b="1" dirty="0" smtClean="0"/>
+              <a:t>rotation-invariant</a:t>
+            </a:r>
+            <a:endParaRPr lang="en-US" sz="1100" b="1" dirty="0" smtClean="0"/>
           </a:p>
           <a:p>
             <a:pPr algn="just">
@@ -3276,10 +3441,72 @@
               </a:lnSpc>
             </a:pPr>
             <a:r>
-              <a:rPr lang="en-US" sz="1200" dirty="0"/>
-              <a:t>How to recognize an object in spite of the partially obscured one?</a:t>
-            </a:r>
-            <a:endParaRPr lang="en-US" sz="1200" dirty="0"/>
+              <a:rPr lang="en-US" sz="1100" dirty="0"/>
+              <a:t>How to recognize the object with </a:t>
+            </a:r>
+            <a:r>
+              <a:rPr lang="en-US" sz="1100" dirty="0">
+                <a:solidFill>
+                  <a:srgbClr val="FF0000"/>
+                </a:solidFill>
+              </a:rPr>
+              <a:t>any angle direction </a:t>
+            </a:r>
+            <a:r>
+              <a:rPr lang="en-US" sz="1100" dirty="0" smtClean="0"/>
+              <a:t>of user’s view?</a:t>
+            </a:r>
+          </a:p>
+          <a:p>
+            <a:pPr algn="just">
+              <a:lnSpc>
+                <a:spcPct val="170000"/>
+              </a:lnSpc>
+            </a:pPr>
+            <a:r>
+              <a:rPr lang="en-US" sz="1100" dirty="0"/>
+              <a:t>How to recognize an object in spite of the</a:t>
+            </a:r>
+            <a:r>
+              <a:rPr lang="en-US" sz="1100" dirty="0">
+                <a:solidFill>
+                  <a:srgbClr val="002060"/>
+                </a:solidFill>
+              </a:rPr>
+              <a:t> partially obscured one</a:t>
+            </a:r>
+            <a:r>
+              <a:rPr lang="en-US" sz="1100" dirty="0" smtClean="0">
+                <a:solidFill>
+                  <a:srgbClr val="002060"/>
+                </a:solidFill>
+              </a:rPr>
+              <a:t>?</a:t>
+            </a:r>
+          </a:p>
+          <a:p>
+            <a:pPr algn="just">
+              <a:lnSpc>
+                <a:spcPct val="170000"/>
+              </a:lnSpc>
+            </a:pPr>
+            <a:endParaRPr lang="en-US" sz="1100" dirty="0" smtClean="0">
+              <a:solidFill>
+                <a:srgbClr val="002060"/>
+              </a:solidFill>
+            </a:endParaRPr>
+          </a:p>
+          <a:p>
+            <a:pPr algn="just">
+              <a:lnSpc>
+                <a:spcPct val="170000"/>
+              </a:lnSpc>
+            </a:pPr>
+            <a:endParaRPr lang="en-US" sz="1100" dirty="0">
+              <a:solidFill>
+                <a:srgbClr val="002060"/>
+              </a:solidFill>
+            </a:endParaRPr>
           </a:p>
         </p:txBody>
       </p:sp>
@@ -3321,7 +3548,7 @@
         </p:nvSpPr>
         <p:spPr>
           <a:xfrm>
-            <a:off x="3523527" y="487319"/>
+            <a:off x="4130110" y="423945"/>
             <a:ext cx="3540213" cy="1552832"/>
           </a:xfrm>
           <a:prstGeom prst="wedgeRectCallout">
@@ -3394,7 +3621,7 @@
         </p:nvSpPr>
         <p:spPr>
           <a:xfrm>
-            <a:off x="3523527" y="2163722"/>
+            <a:off x="4130110" y="2100348"/>
             <a:ext cx="3540214" cy="962112"/>
           </a:xfrm>
           <a:prstGeom prst="wedgeRectCallout">
@@ -3430,11 +3657,6 @@
               </a:rPr>
               <a:t>Proposed improved performance:</a:t>
             </a:r>
-            <a:endParaRPr lang="en-US" sz="1600" b="1" dirty="0" smtClean="0">
-              <a:solidFill>
-                <a:schemeClr val="accent6"/>
-              </a:solidFill>
-            </a:endParaRPr>
           </a:p>
           <a:p>
             <a:r>
@@ -3443,46 +3665,17 @@
                   <a:schemeClr val="accent6"/>
                 </a:solidFill>
               </a:rPr>
-              <a:t>+ </a:t>
-            </a:r>
+              <a:t>+ Geolocation</a:t>
+            </a:r>
+          </a:p>
+          <a:p>
             <a:r>
               <a:rPr lang="en-US" sz="1600" dirty="0" smtClean="0">
                 <a:solidFill>
                   <a:schemeClr val="accent6"/>
                 </a:solidFill>
               </a:rPr>
-              <a:t>Geolocation</a:t>
-            </a:r>
-            <a:endParaRPr lang="en-US" sz="1600" dirty="0" smtClean="0">
-              <a:solidFill>
-                <a:schemeClr val="accent6"/>
-              </a:solidFill>
-            </a:endParaRPr>
-          </a:p>
-          <a:p>
-            <a:r>
-              <a:rPr lang="en-US" sz="1600" dirty="0" smtClean="0">
-                <a:solidFill>
-                  <a:schemeClr val="accent6"/>
-                </a:solidFill>
-              </a:rPr>
-              <a:t>+ </a:t>
-            </a:r>
-            <a:r>
-              <a:rPr lang="en-US" sz="1600" dirty="0" smtClean="0">
-                <a:solidFill>
-                  <a:schemeClr val="accent6"/>
-                </a:solidFill>
-              </a:rPr>
-              <a:t>Hashtag </a:t>
-            </a:r>
-            <a:r>
-              <a:rPr lang="en-US" sz="1600" dirty="0" smtClean="0">
-                <a:solidFill>
-                  <a:schemeClr val="accent6"/>
-                </a:solidFill>
-              </a:rPr>
-              <a:t>information</a:t>
+              <a:t>+ Hashtag information</a:t>
             </a:r>
           </a:p>
         </p:txBody>
@@ -3495,7 +3688,7 @@
         </p:nvSpPr>
         <p:spPr>
           <a:xfrm>
-            <a:off x="3523527" y="3249405"/>
+            <a:off x="4130110" y="3186031"/>
             <a:ext cx="3540213" cy="1205129"/>
           </a:xfrm>
           <a:prstGeom prst="wedgeRectCallout">
@@ -3555,15 +3748,27 @@
                   <a:schemeClr val="accent5"/>
                 </a:solidFill>
               </a:rPr>
-              <a:t>+ </a:t>
-            </a:r>
+              <a:t>+ Private features</a:t>
+            </a:r>
+          </a:p>
+          <a:p>
             <a:r>
               <a:rPr lang="en-US" sz="1600" dirty="0" smtClean="0">
                 <a:solidFill>
                   <a:schemeClr val="accent5"/>
                 </a:solidFill>
               </a:rPr>
-              <a:t>Private </a:t>
+              <a:t>+ Style features</a:t>
+            </a:r>
+          </a:p>
+          <a:p>
+            <a:r>
+              <a:rPr lang="en-US" sz="1600" dirty="0" smtClean="0">
+                <a:solidFill>
+                  <a:schemeClr val="accent5"/>
+                </a:solidFill>
+              </a:rPr>
+              <a:t>+ Guessing </a:t>
             </a:r>
             <a:r>
               <a:rPr lang="en-US" sz="1600" dirty="0" smtClean="0">
@@ -3573,63 +3778,6 @@
               </a:rPr>
               <a:t>features</a:t>
             </a:r>
-          </a:p>
-          <a:p>
-            <a:r>
-              <a:rPr lang="en-US" sz="1600" dirty="0" smtClean="0">
-                <a:solidFill>
-                  <a:schemeClr val="accent5"/>
-                </a:solidFill>
-              </a:rPr>
-              <a:t>+ </a:t>
-            </a:r>
-            <a:r>
-              <a:rPr lang="en-US" sz="1600" dirty="0" smtClean="0">
-                <a:solidFill>
-                  <a:schemeClr val="accent5"/>
-                </a:solidFill>
-              </a:rPr>
-              <a:t>Style </a:t>
-            </a:r>
-            <a:r>
-              <a:rPr lang="en-US" sz="1600" dirty="0" smtClean="0">
-                <a:solidFill>
-                  <a:schemeClr val="accent5"/>
-                </a:solidFill>
-              </a:rPr>
-              <a:t>features</a:t>
-            </a:r>
-          </a:p>
-          <a:p>
-            <a:r>
-              <a:rPr lang="en-US" sz="1600" dirty="0" smtClean="0">
-                <a:solidFill>
-                  <a:schemeClr val="accent5"/>
-                </a:solidFill>
-              </a:rPr>
-              <a:t>+ </a:t>
-            </a:r>
-            <a:r>
-              <a:rPr lang="en-US" sz="1600" dirty="0" smtClean="0">
-                <a:solidFill>
-                  <a:schemeClr val="accent5"/>
-                </a:solidFill>
-              </a:rPr>
-              <a:t>Guessing </a:t>
-            </a:r>
-            <a:r>
-              <a:rPr lang="en-US" sz="1600" dirty="0" smtClean="0">
-                <a:solidFill>
-                  <a:schemeClr val="accent5"/>
-                </a:solidFill>
-              </a:rPr>
-              <a:t>features</a:t>
-            </a:r>
-            <a:endParaRPr lang="en-US" sz="1600" dirty="0">
-              <a:solidFill>
-                <a:schemeClr val="accent5"/>
-              </a:solidFill>
-            </a:endParaRPr>
           </a:p>
         </p:txBody>
       </p:sp>
@@ -3710,7 +3858,7 @@
         </p:nvSpPr>
         <p:spPr>
           <a:xfrm>
-            <a:off x="3523527" y="4578105"/>
+            <a:off x="4130110" y="4514731"/>
             <a:ext cx="3540213" cy="1651245"/>
           </a:xfrm>
           <a:prstGeom prst="wedgeRectCallout">
@@ -3719,6 +3867,11 @@
               <a:gd name="adj2" fmla="val 48991"/>
             </a:avLst>
           </a:prstGeom>
+          <a:ln>
+            <a:solidFill>
+              <a:srgbClr val="FF0000"/>
+            </a:solidFill>
+          </a:ln>
         </p:spPr>
         <p:style>
           <a:lnRef idx="2">
@@ -3744,23 +3897,7 @@
                   <a:srgbClr val="7030A0"/>
                 </a:solidFill>
               </a:rPr>
-              <a:t>Proposed </a:t>
-            </a:r>
-            <a:r>
-              <a:rPr lang="en-US" sz="1600" b="1" dirty="0" smtClean="0">
-                <a:solidFill>
-                  <a:srgbClr val="7030A0"/>
-                </a:solidFill>
-              </a:rPr>
-              <a:t>visualized </a:t>
-            </a:r>
-            <a:r>
-              <a:rPr lang="en-US" sz="1600" b="1" dirty="0" smtClean="0">
-                <a:solidFill>
-                  <a:srgbClr val="7030A0"/>
-                </a:solidFill>
-              </a:rPr>
-              <a:t>features:</a:t>
+              <a:t>Proposed visualized features:</a:t>
             </a:r>
           </a:p>
           <a:p>
@@ -3797,6 +3934,126 @@
                 <a:srgbClr val="7030A0"/>
               </a:solidFill>
             </a:endParaRPr>
+          </a:p>
+        </p:txBody>
+      </p:sp>
+      <p:sp>
+        <p:nvSpPr>
+          <p:cNvPr id="2" name="Right Arrow 1"/>
+          <p:cNvSpPr/>
+          <p:nvPr/>
+        </p:nvSpPr>
+        <p:spPr>
+          <a:xfrm>
+            <a:off x="3440317" y="2507810"/>
+            <a:ext cx="470780" cy="262550"/>
+          </a:xfrm>
+          <a:prstGeom prst="rightArrow">
+            <a:avLst/>
+          </a:prstGeom>
+        </p:spPr>
+        <p:style>
+          <a:lnRef idx="2">
+            <a:schemeClr val="accent6">
+              <a:shade val="50000"/>
+            </a:schemeClr>
+          </a:lnRef>
+          <a:fillRef idx="1">
+            <a:schemeClr val="accent6"/>
+          </a:fillRef>
+          <a:effectRef idx="0">
+            <a:schemeClr val="accent6"/>
+          </a:effectRef>
+          <a:fontRef idx="minor">
+            <a:schemeClr val="lt1"/>
+          </a:fontRef>
+        </p:style>
+        <p:txBody>
+          <a:bodyPr rtlCol="0" anchor="ctr"/>
+          <a:lstStyle/>
+          <a:p>
+            <a:pPr algn="ctr"/>
+            <a:endParaRPr lang="en-US"/>
+          </a:p>
+        </p:txBody>
+      </p:sp>
+      <p:sp>
+        <p:nvSpPr>
+          <p:cNvPr id="11" name="Right Arrow 10"/>
+          <p:cNvSpPr/>
+          <p:nvPr/>
+        </p:nvSpPr>
+        <p:spPr>
+          <a:xfrm>
+            <a:off x="3440317" y="3657320"/>
+            <a:ext cx="470780" cy="262550"/>
+          </a:xfrm>
+          <a:prstGeom prst="rightArrow">
+            <a:avLst/>
+          </a:prstGeom>
+        </p:spPr>
+        <p:style>
+          <a:lnRef idx="2">
+            <a:schemeClr val="accent1">
+              <a:shade val="50000"/>
+            </a:schemeClr>
+          </a:lnRef>
+          <a:fillRef idx="1">
+            <a:schemeClr val="accent1"/>
+          </a:fillRef>
+          <a:effectRef idx="0">
+            <a:schemeClr val="accent1"/>
+          </a:effectRef>
+          <a:fontRef idx="minor">
+            <a:schemeClr val="lt1"/>
+          </a:fontRef>
+        </p:style>
+        <p:txBody>
+          <a:bodyPr rtlCol="0" anchor="ctr"/>
+          <a:lstStyle/>
+          <a:p>
+            <a:pPr algn="ctr"/>
+            <a:endParaRPr lang="en-US"/>
+          </a:p>
+        </p:txBody>
+      </p:sp>
+      <p:sp>
+        <p:nvSpPr>
+          <p:cNvPr id="12" name="Right Arrow 11"/>
+          <p:cNvSpPr/>
+          <p:nvPr/>
+        </p:nvSpPr>
+        <p:spPr>
+          <a:xfrm>
+            <a:off x="3440317" y="5182660"/>
+            <a:ext cx="470780" cy="262550"/>
+          </a:xfrm>
+          <a:prstGeom prst="rightArrow">
+            <a:avLst/>
+          </a:prstGeom>
+        </p:spPr>
+        <p:style>
+          <a:lnRef idx="2">
+            <a:schemeClr val="accent5">
+              <a:shade val="50000"/>
+            </a:schemeClr>
+          </a:lnRef>
+          <a:fillRef idx="1">
+            <a:schemeClr val="accent5"/>
+          </a:fillRef>
+          <a:effectRef idx="0">
+            <a:schemeClr val="accent5"/>
+          </a:effectRef>
+          <a:fontRef idx="minor">
+            <a:schemeClr val="lt1"/>
+          </a:fontRef>
+        </p:style>
+        <p:txBody>
+          <a:bodyPr rtlCol="0" anchor="ctr"/>
+          <a:lstStyle/>
+          <a:p>
+            <a:pPr algn="ctr"/>
+            <a:endParaRPr lang="en-US"/>
           </a:p>
         </p:txBody>
       </p:sp>
@@ -3997,16 +4254,12 @@
               <a:buChar char="ü"/>
             </a:pPr>
             <a:r>
+              <a:rPr lang="en-US" smtClean="0"/>
+              <a:t>Private </a:t>
+            </a:r>
+            <a:r>
               <a:rPr lang="en-US" dirty="0" smtClean="0"/>
-              <a:t> </a:t>
-            </a:r>
-            <a:r>
-              <a:rPr lang="en-US" dirty="0" err="1" smtClean="0"/>
-              <a:t>Privated</a:t>
-            </a:r>
-            <a:r>
-              <a:rPr lang="en-US" dirty="0" smtClean="0"/>
-              <a:t> (Semantic) features</a:t>
+              <a:t>(Semantic) features</a:t>
             </a:r>
           </a:p>
           <a:p>
@@ -4392,26 +4645,42 @@
             <a:pPr algn="just"/>
             <a:r>
               <a:rPr lang="en-US" sz="2000" dirty="0" smtClean="0"/>
-              <a:t>Enhance privacy virtual assistance in Library and Museum </a:t>
+              <a:t>Enhance </a:t>
+            </a:r>
+            <a:r>
+              <a:rPr lang="en-US" sz="2000" b="1" dirty="0" smtClean="0"/>
+              <a:t>privacy virtual assistance </a:t>
+            </a:r>
+            <a:r>
+              <a:rPr lang="en-US" sz="2000" dirty="0" smtClean="0"/>
+              <a:t>in Library and Museum </a:t>
             </a:r>
           </a:p>
           <a:p>
             <a:pPr algn="just"/>
             <a:r>
+              <a:rPr lang="en-US" sz="2000" b="1" dirty="0" smtClean="0">
+                <a:solidFill>
+                  <a:srgbClr val="FF0000"/>
+                </a:solidFill>
+              </a:rPr>
+              <a:t>Improve the accuracy and performance </a:t>
+            </a:r>
+            <a:r>
               <a:rPr lang="en-US" sz="2000" dirty="0" smtClean="0"/>
-              <a:t>Improve </a:t>
+              <a:t>of object recognizing to detect the </a:t>
+            </a:r>
+            <a:r>
+              <a:rPr lang="en-US" sz="2000" b="1" dirty="0" smtClean="0">
+                <a:solidFill>
+                  <a:srgbClr val="0070C0"/>
+                </a:solidFill>
+              </a:rPr>
+              <a:t>“private (semantic) feature</a:t>
             </a:r>
             <a:r>
               <a:rPr lang="en-US" sz="2000" dirty="0" smtClean="0"/>
-              <a:t>the accuracy and performance of object recognizing to detect the “</a:t>
-            </a:r>
-            <a:r>
-              <a:rPr lang="en-US" sz="2000" dirty="0" smtClean="0"/>
-              <a:t>private (semantic) </a:t>
-            </a:r>
-            <a:r>
-              <a:rPr lang="en-US" sz="2000" dirty="0" smtClean="0"/>
-              <a:t>feature” of each artwork, specimen in the museum,  or person, car, furniture, the original of items, etc., </a:t>
+              <a:t>” of each artwork, specimen in the museum,  or person, car, furniture, the original of items, etc., </a:t>
             </a:r>
           </a:p>
           <a:p>
@@ -4421,8 +4690,18 @@
               <a:t>Design </a:t>
             </a:r>
             <a:r>
+              <a:rPr lang="en-US" sz="2000" b="1" dirty="0" smtClean="0">
+                <a:solidFill>
+                  <a:schemeClr val="accent6">
+                    <a:lumMod val="50000"/>
+                  </a:schemeClr>
+                </a:solidFill>
+              </a:rPr>
+              <a:t>automatically category mechanism for object recognition</a:t>
+            </a:r>
+            <a:r>
               <a:rPr lang="en-US" sz="2000" dirty="0" smtClean="0"/>
-              <a:t>automatically category mechanism for object recognition, and application development as well as for detecting </a:t>
+              <a:t>, and application development as well as for detecting </a:t>
             </a:r>
             <a:r>
               <a:rPr lang="en-US" sz="2000" dirty="0"/>
@@ -4437,29 +4716,47 @@
             <a:pPr algn="just"/>
             <a:r>
               <a:rPr lang="en-US" sz="2000" dirty="0" smtClean="0"/>
-              <a:t>Develop </a:t>
-            </a:r>
+              <a:t>Develop algorithms and applications based on the given metadata of the </a:t>
+            </a:r>
+            <a:r>
+              <a:rPr lang="en-US" sz="2000" b="1" dirty="0" smtClean="0"/>
+              <a:t>library, museum, or open data</a:t>
+            </a:r>
+          </a:p>
+          <a:p>
+            <a:pPr algn="just"/>
             <a:r>
               <a:rPr lang="en-US" sz="2000" dirty="0" smtClean="0"/>
-              <a:t>algorithms and applications based on the given metadata of the library, museum, or open </a:t>
+              <a:t>Develop algorithm to </a:t>
+            </a:r>
+            <a:r>
+              <a:rPr lang="en-US" sz="2000" b="1" dirty="0" smtClean="0">
+                <a:solidFill>
+                  <a:schemeClr val="accent6">
+                    <a:lumMod val="50000"/>
+                  </a:schemeClr>
+                </a:solidFill>
+              </a:rPr>
+              <a:t>generate the 4 sides of an object </a:t>
             </a:r>
             <a:r>
               <a:rPr lang="en-US" sz="2000" dirty="0" smtClean="0"/>
-              <a:t>data</a:t>
+              <a:t>based on this one’s front side</a:t>
             </a:r>
           </a:p>
           <a:p>
             <a:pPr algn="just"/>
             <a:r>
+              <a:rPr lang="en-US" sz="2000" b="1" dirty="0" smtClean="0">
+                <a:solidFill>
+                  <a:srgbClr val="FF0000"/>
+                </a:solidFill>
+              </a:rPr>
+              <a:t>Optimize the performance of search algorithm </a:t>
+            </a:r>
+            <a:r>
               <a:rPr lang="en-US" sz="2000" dirty="0" smtClean="0"/>
-              <a:t>Develop algorithm to generate the 4 sides of an object based on this one’s front side</a:t>
-            </a:r>
-          </a:p>
-          <a:p>
-            <a:pPr algn="just"/>
-            <a:r>
-              <a:rPr lang="en-US" sz="2000" dirty="0" smtClean="0"/>
-              <a:t>Optimize the performance of search algorithm by considering the boundary of the items</a:t>
+              <a:t>by considering the boundary of the items</a:t>
             </a:r>
           </a:p>
           <a:p>
@@ -4560,66 +4857,101 @@
             <a:pPr algn="just"/>
             <a:r>
               <a:rPr lang="en-US" sz="1600" dirty="0" smtClean="0"/>
-              <a:t>Exploit the Artificial, Deep, Recurrent, Convolutional neural networks (ANN,DNN,RNN,CNN), Supervised, Unsupervised, and Deep Reinforcement learning, Search Engine algorithm to improve the quality of object recognition.</a:t>
+              <a:t>Exploit the </a:t>
+            </a:r>
+            <a:r>
+              <a:rPr lang="en-US" sz="1600" b="1" dirty="0" smtClean="0"/>
+              <a:t>Artificial, Deep, Recurrent, Convolutional neural networks (ANN,DNN,RNN,CNN), Supervised, Unsupervised, and Deep Reinforcement learning</a:t>
+            </a:r>
+            <a:r>
+              <a:rPr lang="en-US" sz="1600" dirty="0" smtClean="0"/>
+              <a:t>, Search Engine algorithm to improve the quality of object recognition.</a:t>
             </a:r>
           </a:p>
           <a:p>
             <a:pPr algn="just"/>
             <a:r>
+              <a:rPr lang="en-US" sz="1600" b="1" dirty="0" smtClean="0"/>
+              <a:t>Generate the Holographic, Virtual and </a:t>
+            </a:r>
+            <a:r>
+              <a:rPr lang="en-US" sz="1600" b="1" dirty="0"/>
+              <a:t>Augmented </a:t>
+            </a:r>
+            <a:r>
+              <a:rPr lang="en-US" sz="1600" b="1" dirty="0" smtClean="0"/>
+              <a:t>reality </a:t>
+            </a:r>
+            <a:r>
               <a:rPr lang="en-US" sz="1600" dirty="0" smtClean="0"/>
-              <a:t>Generate the Holographic, Virtual and </a:t>
+              <a:t>to make an impressive and efficient visual item</a:t>
+            </a:r>
+          </a:p>
+          <a:p>
+            <a:pPr algn="just"/>
+            <a:r>
+              <a:rPr lang="en-US" sz="1600" b="1" dirty="0" smtClean="0"/>
+              <a:t>Apply a natural language user interface </a:t>
+            </a:r>
+            <a:r>
+              <a:rPr lang="en-US" sz="1600" dirty="0" smtClean="0"/>
+              <a:t>to attempt to answer questions, make recommendation, and perform actions by delegating requests to a set of Internet services</a:t>
+            </a:r>
+          </a:p>
+          <a:p>
+            <a:pPr algn="just"/>
+            <a:r>
+              <a:rPr lang="en-US" sz="1600" dirty="0" smtClean="0"/>
+              <a:t>Build-up machine learning algorithms and artificial intelligence in order to recognize, analyze and make the explanation of a given object by </a:t>
+            </a:r>
+            <a:r>
+              <a:rPr lang="en-US" sz="1600" b="1" dirty="0" smtClean="0"/>
+              <a:t>using smartphone camera.</a:t>
+            </a:r>
+          </a:p>
+          <a:p>
+            <a:pPr algn="just"/>
+            <a:r>
+              <a:rPr lang="en-US" sz="1600" b="1" dirty="0" smtClean="0"/>
+              <a:t>Optimizing and improving the performance </a:t>
+            </a:r>
+            <a:r>
+              <a:rPr lang="en-US" sz="1600" dirty="0" smtClean="0"/>
+              <a:t>of system by considering the </a:t>
+            </a:r>
+            <a:r>
+              <a:rPr lang="en-US" sz="1600" b="1" dirty="0" smtClean="0"/>
+              <a:t>boundary geolocation</a:t>
+            </a:r>
+            <a:r>
+              <a:rPr lang="en-US" sz="1600" dirty="0" smtClean="0"/>
+              <a:t> of items </a:t>
+            </a:r>
+          </a:p>
+          <a:p>
+            <a:pPr algn="just"/>
+            <a:r>
+              <a:rPr lang="en-US" sz="1600" b="1" dirty="0" smtClean="0"/>
+              <a:t>Make the approximated verification method </a:t>
+            </a:r>
+            <a:r>
+              <a:rPr lang="en-US" sz="1600" dirty="0" smtClean="0"/>
+              <a:t>to confirm the accuracy of generated information </a:t>
+            </a:r>
+          </a:p>
+          <a:p>
+            <a:pPr algn="just"/>
+            <a:r>
+              <a:rPr lang="en-US" sz="1600" b="1" dirty="0" smtClean="0"/>
+              <a:t>Generate the  </a:t>
+            </a:r>
+            <a:r>
+              <a:rPr lang="en-US" sz="1600" b="1" dirty="0"/>
+              <a:t>4 sides of an object </a:t>
             </a:r>
             <a:r>
               <a:rPr lang="en-US" sz="1600" dirty="0"/>
-              <a:t>Augmented </a:t>
-            </a:r>
-            <a:r>
-              <a:rPr lang="en-US" sz="1600" dirty="0" smtClean="0"/>
-              <a:t>reality to make an impressive and efficient visual item</a:t>
-            </a:r>
-          </a:p>
-          <a:p>
-            <a:pPr algn="just"/>
-            <a:r>
-              <a:rPr lang="en-US" sz="1600" dirty="0" smtClean="0"/>
-              <a:t>Apply a natural language user interface to attempt to answer questions, make recommendation, and perform actions by delegating requests to a set of Internet services</a:t>
-            </a:r>
-          </a:p>
-          <a:p>
-            <a:pPr algn="just"/>
-            <a:r>
-              <a:rPr lang="en-US" sz="1600" dirty="0" smtClean="0"/>
-              <a:t>Build-up machine learning algorithms and artificial intelligence in order to recognize, analyze and make the explanation of a given object by using smartphone camera.</a:t>
-            </a:r>
-          </a:p>
-          <a:p>
-            <a:pPr algn="just"/>
-            <a:r>
-              <a:rPr lang="en-US" sz="1600" dirty="0" smtClean="0"/>
-              <a:t>Optimizing and improving the performance of system by considering the boundary geolocation of items </a:t>
-            </a:r>
-          </a:p>
-          <a:p>
-            <a:pPr algn="just"/>
-            <a:r>
-              <a:rPr lang="en-US" sz="1600" dirty="0" smtClean="0"/>
-              <a:t>Make the approximated verification method to confirm the accuracy of generated information </a:t>
-            </a:r>
-            <a:endParaRPr lang="en-US" sz="1600" dirty="0" smtClean="0"/>
-          </a:p>
-          <a:p>
-            <a:pPr algn="just"/>
-            <a:r>
-              <a:rPr lang="en-US" sz="1600" dirty="0" smtClean="0"/>
-              <a:t>Generate the </a:t>
-            </a:r>
-            <a:r>
-              <a:rPr lang="en-US" sz="1600" dirty="0" smtClean="0"/>
-              <a:t> </a:t>
-            </a:r>
-            <a:r>
-              <a:rPr lang="en-US" sz="1600" dirty="0"/>
-              <a:t>4 sides of an object based on this one’s front </a:t>
+              <a:t>based on this one’s front </a:t>
             </a:r>
             <a:r>
               <a:rPr lang="en-US" sz="1600" dirty="0" smtClean="0"/>
@@ -4631,15 +4963,11 @@
             <a:pPr algn="just"/>
             <a:r>
               <a:rPr lang="en-US" sz="1600" dirty="0" smtClean="0"/>
-              <a:t>Update </a:t>
-            </a:r>
-            <a:r>
-              <a:rPr lang="en-US" sz="1600" dirty="0" smtClean="0"/>
-              <a:t>the knowledge of the system based on the users’ </a:t>
-            </a:r>
-            <a:r>
-              <a:rPr lang="en-US" sz="1600" dirty="0" smtClean="0"/>
-              <a:t>contributions</a:t>
+              <a:t>Update the knowledge of the system based on </a:t>
+            </a:r>
+            <a:r>
+              <a:rPr lang="en-US" sz="1600" b="1" dirty="0" smtClean="0"/>
+              <a:t>the users’ contributions</a:t>
             </a:r>
           </a:p>
           <a:p>
@@ -8825,11 +9153,7 @@
             </a:r>
             <a:r>
               <a:rPr lang="en-US" sz="1100" dirty="0" smtClean="0"/>
-              <a:t>, “ A Review on CBIR with its Advantages and Disadvantages for Low-level Features”, in International Journal of Computer Sciences and Engineering, Vol : Issue 7, 2016, pp. 161- </a:t>
-            </a:r>
-            <a:r>
-              <a:rPr lang="en-US" sz="1100" dirty="0" smtClean="0"/>
-              <a:t>167</a:t>
+              <a:t>, “ A Review on CBIR with its Advantages and Disadvantages for Low-level Features”, in International Journal of Computer Sciences and Engineering, Vol : Issue 7, 2016, pp. 161- 167</a:t>
             </a:r>
           </a:p>
           <a:p>

</xml_diff>

<commit_message>
update the slide with some example related to the hologram and vr, ar
</commit_message>
<xml_diff>
--- a/DGA1031/What is it.pptx
+++ b/DGA1031/What is it.pptx
@@ -12,24 +12,26 @@
     <p:sldId id="269" r:id="rId6"/>
     <p:sldId id="265" r:id="rId7"/>
     <p:sldId id="267" r:id="rId8"/>
-    <p:sldId id="268" r:id="rId9"/>
-    <p:sldId id="280" r:id="rId10"/>
-    <p:sldId id="273" r:id="rId11"/>
-    <p:sldId id="261" r:id="rId12"/>
-    <p:sldId id="272" r:id="rId13"/>
-    <p:sldId id="276" r:id="rId14"/>
-    <p:sldId id="277" r:id="rId15"/>
-    <p:sldId id="275" r:id="rId16"/>
-    <p:sldId id="278" r:id="rId17"/>
-    <p:sldId id="279" r:id="rId18"/>
-    <p:sldId id="281" r:id="rId19"/>
-    <p:sldId id="282" r:id="rId20"/>
-    <p:sldId id="283" r:id="rId21"/>
-    <p:sldId id="262" r:id="rId22"/>
-    <p:sldId id="263" r:id="rId23"/>
-    <p:sldId id="270" r:id="rId24"/>
-    <p:sldId id="264" r:id="rId25"/>
-    <p:sldId id="274" r:id="rId26"/>
+    <p:sldId id="284" r:id="rId9"/>
+    <p:sldId id="268" r:id="rId10"/>
+    <p:sldId id="280" r:id="rId11"/>
+    <p:sldId id="273" r:id="rId12"/>
+    <p:sldId id="261" r:id="rId13"/>
+    <p:sldId id="285" r:id="rId14"/>
+    <p:sldId id="272" r:id="rId15"/>
+    <p:sldId id="276" r:id="rId16"/>
+    <p:sldId id="277" r:id="rId17"/>
+    <p:sldId id="275" r:id="rId18"/>
+    <p:sldId id="278" r:id="rId19"/>
+    <p:sldId id="279" r:id="rId20"/>
+    <p:sldId id="281" r:id="rId21"/>
+    <p:sldId id="282" r:id="rId22"/>
+    <p:sldId id="283" r:id="rId23"/>
+    <p:sldId id="262" r:id="rId24"/>
+    <p:sldId id="263" r:id="rId25"/>
+    <p:sldId id="270" r:id="rId26"/>
+    <p:sldId id="264" r:id="rId27"/>
+    <p:sldId id="274" r:id="rId28"/>
   </p:sldIdLst>
   <p:sldSz cx="12192000" cy="6858000"/>
   <p:notesSz cx="6858000" cy="9144000"/>
@@ -130,7 +132,7 @@
   </p:defaultTextStyle>
   <p:extLst>
     <p:ext uri="{EFAFB233-063F-42B5-8137-9DF3F51BA10A}">
-      <p15:sldGuideLst xmlns:p15="http://schemas.microsoft.com/office/powerpoint/2012/main">
+      <p15:sldGuideLst xmlns:p15="http://schemas.microsoft.com/office/powerpoint/2012/main" xmlns="">
         <p15:guide id="1" orient="horz" pos="2160">
           <p15:clr>
             <a:srgbClr val="A4A3A4"/>
@@ -280,7 +282,7 @@
           <a:p>
             <a:fld id="{276D79ED-3FA7-4EF8-964B-EB8BCFAB02F8}" type="datetimeFigureOut">
               <a:rPr lang="en-US" smtClean="0"/>
-              <a:t>2/22/2018</a:t>
+              <a:t>22/02/2018</a:t>
             </a:fld>
             <a:endParaRPr lang="en-US"/>
           </a:p>
@@ -450,7 +452,7 @@
           <a:p>
             <a:fld id="{276D79ED-3FA7-4EF8-964B-EB8BCFAB02F8}" type="datetimeFigureOut">
               <a:rPr lang="en-US" smtClean="0"/>
-              <a:t>2/22/2018</a:t>
+              <a:t>22/02/2018</a:t>
             </a:fld>
             <a:endParaRPr lang="en-US"/>
           </a:p>
@@ -698,7 +700,7 @@
           <a:p>
             <a:fld id="{276D79ED-3FA7-4EF8-964B-EB8BCFAB02F8}" type="datetimeFigureOut">
               <a:rPr lang="en-US" smtClean="0"/>
-              <a:t>2/22/2018</a:t>
+              <a:t>22/02/2018</a:t>
             </a:fld>
             <a:endParaRPr lang="en-US"/>
           </a:p>
@@ -930,7 +932,7 @@
           <a:p>
             <a:fld id="{276D79ED-3FA7-4EF8-964B-EB8BCFAB02F8}" type="datetimeFigureOut">
               <a:rPr lang="en-US" smtClean="0"/>
-              <a:t>2/22/2018</a:t>
+              <a:t>22/02/2018</a:t>
             </a:fld>
             <a:endParaRPr lang="en-US"/>
           </a:p>
@@ -1297,7 +1299,7 @@
           <a:p>
             <a:fld id="{276D79ED-3FA7-4EF8-964B-EB8BCFAB02F8}" type="datetimeFigureOut">
               <a:rPr lang="en-US" smtClean="0"/>
-              <a:t>2/22/2018</a:t>
+              <a:t>22/02/2018</a:t>
             </a:fld>
             <a:endParaRPr lang="en-US"/>
           </a:p>
@@ -1415,7 +1417,7 @@
           <a:p>
             <a:fld id="{276D79ED-3FA7-4EF8-964B-EB8BCFAB02F8}" type="datetimeFigureOut">
               <a:rPr lang="en-US" smtClean="0"/>
-              <a:t>2/22/2018</a:t>
+              <a:t>22/02/2018</a:t>
             </a:fld>
             <a:endParaRPr lang="en-US"/>
           </a:p>
@@ -1510,7 +1512,7 @@
           <a:p>
             <a:fld id="{276D79ED-3FA7-4EF8-964B-EB8BCFAB02F8}" type="datetimeFigureOut">
               <a:rPr lang="en-US" smtClean="0"/>
-              <a:t>2/22/2018</a:t>
+              <a:t>22/02/2018</a:t>
             </a:fld>
             <a:endParaRPr lang="en-US"/>
           </a:p>
@@ -1787,7 +1789,7 @@
           <a:p>
             <a:fld id="{276D79ED-3FA7-4EF8-964B-EB8BCFAB02F8}" type="datetimeFigureOut">
               <a:rPr lang="en-US" smtClean="0"/>
-              <a:t>2/22/2018</a:t>
+              <a:t>22/02/2018</a:t>
             </a:fld>
             <a:endParaRPr lang="en-US"/>
           </a:p>
@@ -2044,7 +2046,7 @@
           <a:p>
             <a:fld id="{276D79ED-3FA7-4EF8-964B-EB8BCFAB02F8}" type="datetimeFigureOut">
               <a:rPr lang="en-US" smtClean="0"/>
-              <a:t>2/22/2018</a:t>
+              <a:t>22/02/2018</a:t>
             </a:fld>
             <a:endParaRPr lang="en-US"/>
           </a:p>
@@ -2265,7 +2267,7 @@
           <a:p>
             <a:fld id="{276D79ED-3FA7-4EF8-964B-EB8BCFAB02F8}" type="datetimeFigureOut">
               <a:rPr lang="en-US" smtClean="0"/>
-              <a:t>2/22/2018</a:t>
+              <a:t>22/02/2018</a:t>
             </a:fld>
             <a:endParaRPr lang="en-US"/>
           </a:p>
@@ -2922,6 +2924,315 @@
       </p:grpSpPr>
       <p:sp>
         <p:nvSpPr>
+          <p:cNvPr id="2" name="Title 1"/>
+          <p:cNvSpPr>
+            <a:spLocks noGrp="1"/>
+          </p:cNvSpPr>
+          <p:nvPr>
+            <p:ph type="title"/>
+          </p:nvPr>
+        </p:nvSpPr>
+        <p:spPr/>
+        <p:txBody>
+          <a:bodyPr/>
+          <a:lstStyle/>
+          <a:p>
+            <a:r>
+              <a:rPr lang="en-US" dirty="0"/>
+              <a:t>Literature review</a:t>
+            </a:r>
+          </a:p>
+        </p:txBody>
+      </p:sp>
+      <p:sp>
+        <p:nvSpPr>
+          <p:cNvPr id="4" name="Content Placeholder 2"/>
+          <p:cNvSpPr>
+            <a:spLocks noGrp="1"/>
+          </p:cNvSpPr>
+          <p:nvPr>
+            <p:ph idx="1"/>
+          </p:nvPr>
+        </p:nvSpPr>
+        <p:spPr>
+          <a:xfrm>
+            <a:off x="3095897" y="1841862"/>
+            <a:ext cx="8623663" cy="4825638"/>
+          </a:xfrm>
+        </p:spPr>
+        <p:txBody>
+          <a:bodyPr>
+            <a:noAutofit/>
+          </a:bodyPr>
+          <a:lstStyle/>
+          <a:p>
+            <a:r>
+              <a:rPr lang="en-US" sz="1100" dirty="0"/>
+              <a:t>[</a:t>
+            </a:r>
+            <a:r>
+              <a:rPr lang="en-US" sz="1100" dirty="0" smtClean="0"/>
+              <a:t>12] S. </a:t>
+            </a:r>
+            <a:r>
+              <a:rPr lang="en-US" sz="1100" dirty="0" err="1" smtClean="0"/>
+              <a:t>Karayev</a:t>
+            </a:r>
+            <a:r>
+              <a:rPr lang="en-US" sz="1100" dirty="0" smtClean="0"/>
+              <a:t>, M. </a:t>
+            </a:r>
+            <a:r>
+              <a:rPr lang="en-US" sz="1100" dirty="0" err="1" smtClean="0"/>
+              <a:t>Trentacoste</a:t>
+            </a:r>
+            <a:r>
+              <a:rPr lang="en-US" sz="1100" dirty="0" smtClean="0"/>
+              <a:t>, H. Han, A. </a:t>
+            </a:r>
+            <a:r>
+              <a:rPr lang="en-US" sz="1100" dirty="0" err="1" smtClean="0"/>
+              <a:t>Agarwala</a:t>
+            </a:r>
+            <a:r>
+              <a:rPr lang="en-US" sz="1100" dirty="0" smtClean="0"/>
+              <a:t>, T. Darrell, A. </a:t>
+            </a:r>
+            <a:r>
+              <a:rPr lang="en-US" sz="1100" dirty="0" err="1" smtClean="0"/>
+              <a:t>Hertzmann</a:t>
+            </a:r>
+            <a:r>
+              <a:rPr lang="en-US" sz="1100" dirty="0" smtClean="0"/>
+              <a:t>, H. </a:t>
+            </a:r>
+            <a:r>
+              <a:rPr lang="en-US" sz="1100" dirty="0" err="1" smtClean="0"/>
+              <a:t>Winnemoeller</a:t>
+            </a:r>
+            <a:r>
+              <a:rPr lang="en-US" sz="1100" dirty="0" smtClean="0"/>
+              <a:t> , “ Recognizing </a:t>
+            </a:r>
+            <a:r>
+              <a:rPr lang="en-US" sz="1100" dirty="0"/>
+              <a:t>Image style”, </a:t>
+            </a:r>
+            <a:r>
+              <a:rPr lang="en-US" sz="1100" dirty="0">
+                <a:hlinkClick r:id="rId2"/>
+              </a:rPr>
+              <a:t>https://</a:t>
+            </a:r>
+            <a:r>
+              <a:rPr lang="en-US" sz="1100" dirty="0" smtClean="0">
+                <a:hlinkClick r:id="rId2"/>
+              </a:rPr>
+              <a:t>sergeykarayev.com/files/1311.3715v3.pdf</a:t>
+            </a:r>
+            <a:endParaRPr lang="en-US" sz="1100" dirty="0" smtClean="0"/>
+          </a:p>
+          <a:p>
+            <a:r>
+              <a:rPr lang="en-US" sz="1100" dirty="0" smtClean="0"/>
+              <a:t>[13] X. Yu, J. Yang, L. Luo, W. Li, J. Brandt, D. </a:t>
+            </a:r>
+            <a:r>
+              <a:rPr lang="en-US" sz="1100" dirty="0" err="1" smtClean="0"/>
+              <a:t>Metaxas,”Customized</a:t>
+            </a:r>
+            <a:r>
+              <a:rPr lang="en-US" sz="1100" dirty="0" smtClean="0"/>
+              <a:t> expression recognition for performance-driven cutout character animation”, in Applications of Computer Vision(WACV), 2016, IEEE Winter Conference</a:t>
+            </a:r>
+          </a:p>
+          <a:p>
+            <a:r>
+              <a:rPr lang="en-US" sz="1100" dirty="0" smtClean="0"/>
+              <a:t>[14] X. </a:t>
+            </a:r>
+            <a:r>
+              <a:rPr lang="en-US" sz="1100" dirty="0" err="1" smtClean="0"/>
+              <a:t>Jin</a:t>
+            </a:r>
+            <a:r>
+              <a:rPr lang="en-US" sz="1100" dirty="0" smtClean="0"/>
+              <a:t>, J. Kim</a:t>
+            </a:r>
+            <a:r>
+              <a:rPr lang="en-US" sz="1100" dirty="0"/>
+              <a:t>, “</a:t>
+            </a:r>
+            <a:r>
+              <a:rPr lang="en-US" sz="1100" dirty="0" err="1"/>
+              <a:t>ArtWork</a:t>
+            </a:r>
+            <a:r>
+              <a:rPr lang="en-US" sz="1100" dirty="0"/>
+              <a:t> Recognition in 360-degree Image using 32- </a:t>
+            </a:r>
+            <a:r>
+              <a:rPr lang="en-US" sz="1100" dirty="0" err="1"/>
+              <a:t>hedron</a:t>
+            </a:r>
+            <a:r>
+              <a:rPr lang="en-US" sz="1100" dirty="0"/>
+              <a:t> based Rectilinear Projection and Scale Invariant Feature Transform </a:t>
+            </a:r>
+            <a:r>
+              <a:rPr lang="en-US" sz="1100" dirty="0" smtClean="0"/>
+              <a:t>“, in ICEICT, IEEE </a:t>
+            </a:r>
+            <a:r>
+              <a:rPr lang="en-US" sz="1100" dirty="0" err="1" smtClean="0"/>
+              <a:t>Int</a:t>
+            </a:r>
+            <a:r>
+              <a:rPr lang="en-US" sz="1100" dirty="0" smtClean="0"/>
+              <a:t> </a:t>
+            </a:r>
+            <a:r>
+              <a:rPr lang="en-US" sz="1100" dirty="0" err="1" smtClean="0"/>
+              <a:t>Conf</a:t>
+            </a:r>
+            <a:r>
+              <a:rPr lang="en-US" sz="1100" dirty="0" smtClean="0"/>
+              <a:t>, 2017, pp 356-359</a:t>
+            </a:r>
+          </a:p>
+          <a:p>
+            <a:r>
+              <a:rPr lang="en-US" sz="1100" dirty="0" smtClean="0"/>
+              <a:t>[15] T. </a:t>
+            </a:r>
+            <a:r>
+              <a:rPr lang="en-US" sz="1100" dirty="0" err="1" smtClean="0"/>
+              <a:t>Ruzic</a:t>
+            </a:r>
+            <a:r>
+              <a:rPr lang="en-US" sz="1100" dirty="0" smtClean="0"/>
+              <a:t>, B. </a:t>
+            </a:r>
+            <a:r>
+              <a:rPr lang="en-US" sz="1100" dirty="0" err="1" smtClean="0"/>
+              <a:t>cornelis</a:t>
+            </a:r>
+            <a:r>
+              <a:rPr lang="en-US" sz="1100" dirty="0" smtClean="0"/>
+              <a:t>, L. </a:t>
+            </a:r>
+            <a:r>
+              <a:rPr lang="en-US" sz="1100" dirty="0" err="1" smtClean="0"/>
+              <a:t>Platisa</a:t>
+            </a:r>
+            <a:r>
+              <a:rPr lang="en-US" sz="1100" dirty="0" smtClean="0"/>
+              <a:t>, A. </a:t>
+            </a:r>
+            <a:r>
+              <a:rPr lang="en-US" sz="1100" dirty="0" err="1" smtClean="0"/>
+              <a:t>Pizurica</a:t>
+            </a:r>
+            <a:r>
+              <a:rPr lang="en-US" sz="1100" dirty="0" smtClean="0"/>
+              <a:t>, A. Dooms, W. Philips, M. Martens, M. D. </a:t>
+            </a:r>
+            <a:r>
+              <a:rPr lang="en-US" sz="1100" dirty="0" err="1" smtClean="0"/>
+              <a:t>Mey</a:t>
+            </a:r>
+            <a:r>
+              <a:rPr lang="en-US" sz="1100" dirty="0" smtClean="0"/>
+              <a:t>, I. </a:t>
+            </a:r>
+            <a:r>
+              <a:rPr lang="en-US" sz="1100" dirty="0" err="1" smtClean="0"/>
+              <a:t>Daubechies</a:t>
+            </a:r>
+            <a:r>
+              <a:rPr lang="en-US" sz="1100" dirty="0" smtClean="0"/>
+              <a:t>, “Virtual Restoration of the Ghent Altarpiece Using Crack Detection and </a:t>
+            </a:r>
+            <a:r>
+              <a:rPr lang="en-US" sz="1100" dirty="0" err="1" smtClean="0"/>
+              <a:t>Inpainting</a:t>
+            </a:r>
+            <a:r>
+              <a:rPr lang="en-US" sz="1100" dirty="0" smtClean="0"/>
+              <a:t>”, in ACIVS 2011, pp 417-428.</a:t>
+            </a:r>
+          </a:p>
+          <a:p>
+            <a:r>
+              <a:rPr lang="en-US" sz="1100" dirty="0" smtClean="0"/>
+              <a:t>[16] P. </a:t>
+            </a:r>
+            <a:r>
+              <a:rPr lang="en-US" sz="1100" dirty="0" err="1" smtClean="0"/>
+              <a:t>Wohlhart</a:t>
+            </a:r>
+            <a:r>
+              <a:rPr lang="en-US" sz="1100" dirty="0" smtClean="0"/>
+              <a:t> and V. </a:t>
+            </a:r>
+            <a:r>
+              <a:rPr lang="en-US" sz="1100" dirty="0" err="1" smtClean="0"/>
+              <a:t>Lepetit</a:t>
+            </a:r>
+            <a:r>
+              <a:rPr lang="en-US" sz="1100" dirty="0" smtClean="0"/>
+              <a:t>, “Learning descriptors for object recognition and 3D pose estimation”, in CVPR, </a:t>
+            </a:r>
+            <a:r>
+              <a:rPr lang="en-US" sz="1100" smtClean="0"/>
+              <a:t>IEEE Conference, 2015, pp 3109-3118</a:t>
+            </a:r>
+            <a:endParaRPr lang="en-US" sz="1100" dirty="0" smtClean="0"/>
+          </a:p>
+          <a:p>
+            <a:endParaRPr lang="en-US" sz="1100" dirty="0"/>
+          </a:p>
+        </p:txBody>
+      </p:sp>
+    </p:spTree>
+    <p:extLst>
+      <p:ext uri="{BB962C8B-B14F-4D97-AF65-F5344CB8AC3E}">
+        <p14:creationId xmlns:p14="http://schemas.microsoft.com/office/powerpoint/2010/main" val="1440396747"/>
+      </p:ext>
+    </p:extLst>
+  </p:cSld>
+  <p:clrMapOvr>
+    <a:masterClrMapping/>
+  </p:clrMapOvr>
+  <p:timing>
+    <p:tnLst>
+      <p:par>
+        <p:cTn id="1" dur="indefinite" restart="never" nodeType="tmRoot"/>
+      </p:par>
+    </p:tnLst>
+  </p:timing>
+</p:sld>
+</file>
+
+<file path=ppt/slides/slide11.xml><?xml version="1.0" encoding="utf-8"?>
+<p:sld xmlns:a="http://schemas.openxmlformats.org/drawingml/2006/main" xmlns:r="http://schemas.openxmlformats.org/officeDocument/2006/relationships" xmlns:p="http://schemas.openxmlformats.org/presentationml/2006/main">
+  <p:cSld>
+    <p:spTree>
+      <p:nvGrpSpPr>
+        <p:cNvPr id="1" name=""/>
+        <p:cNvGrpSpPr/>
+        <p:nvPr/>
+      </p:nvGrpSpPr>
+      <p:grpSpPr>
+        <a:xfrm>
+          <a:off x="0" y="0"/>
+          <a:ext cx="0" cy="0"/>
+          <a:chOff x="0" y="0"/>
+          <a:chExt cx="0" cy="0"/>
+        </a:xfrm>
+      </p:grpSpPr>
+      <p:sp>
+        <p:nvSpPr>
           <p:cNvPr id="6" name="Rectangular Callout 5"/>
           <p:cNvSpPr/>
           <p:nvPr/>
@@ -3103,7 +3414,11 @@
           <a:p>
             <a:r>
               <a:rPr lang="en-US" dirty="0"/>
-              <a:t>+ Performance: time </a:t>
+              <a:t>+ Performance: </a:t>
+            </a:r>
+            <a:r>
+              <a:rPr lang="en-US" dirty="0" smtClean="0"/>
+              <a:t>time </a:t>
             </a:r>
             <a:r>
               <a:rPr lang="en-US" dirty="0" smtClean="0"/>
@@ -3143,10 +3458,17 @@
   <p:clrMapOvr>
     <a:masterClrMapping/>
   </p:clrMapOvr>
+  <p:timing>
+    <p:tnLst>
+      <p:par>
+        <p:cTn id="1" dur="indefinite" restart="never" nodeType="tmRoot"/>
+      </p:par>
+    </p:tnLst>
+  </p:timing>
 </p:sld>
 </file>
 
-<file path=ppt/slides/slide11.xml><?xml version="1.0" encoding="utf-8"?>
+<file path=ppt/slides/slide12.xml><?xml version="1.0" encoding="utf-8"?>
 <p:sld xmlns:a="http://schemas.openxmlformats.org/drawingml/2006/main" xmlns:r="http://schemas.openxmlformats.org/officeDocument/2006/relationships" xmlns:p="http://schemas.openxmlformats.org/presentationml/2006/main" showMasterSp="0">
   <p:cSld>
     <p:spTree>
@@ -3214,11 +3536,11 @@
               </a:lnSpc>
             </a:pPr>
             <a:r>
-              <a:rPr lang="en-US" sz="1100" dirty="0" smtClean="0"/>
+              <a:rPr lang="en-US" sz="2000" dirty="0" smtClean="0"/>
               <a:t>Identify and recognize the object with the </a:t>
             </a:r>
             <a:r>
-              <a:rPr lang="en-US" sz="1100" b="1" dirty="0" smtClean="0">
+              <a:rPr lang="en-US" sz="2000" b="1" dirty="0" smtClean="0">
                 <a:solidFill>
                   <a:srgbClr val="0070C0"/>
                 </a:solidFill>
@@ -3226,7 +3548,7 @@
               <a:t>“private feature” </a:t>
             </a:r>
             <a:r>
-              <a:rPr lang="en-US" sz="1100" dirty="0" smtClean="0"/>
+              <a:rPr lang="en-US" sz="2000" dirty="0" smtClean="0"/>
               <a:t>of artwork, specimen, whatever</a:t>
             </a:r>
           </a:p>
@@ -3237,11 +3559,11 @@
               </a:lnSpc>
             </a:pPr>
             <a:r>
-              <a:rPr lang="en-US" sz="1100" dirty="0" smtClean="0"/>
+              <a:rPr lang="en-US" sz="2000" dirty="0" smtClean="0"/>
               <a:t>Faster handling of responding for </a:t>
             </a:r>
             <a:r>
-              <a:rPr lang="en-US" sz="1100" dirty="0" smtClean="0">
+              <a:rPr lang="en-US" sz="2000" dirty="0" smtClean="0">
                 <a:solidFill>
                   <a:srgbClr val="FF0000"/>
                 </a:solidFill>
@@ -3249,7 +3571,7 @@
               <a:t>real time </a:t>
             </a:r>
             <a:r>
-              <a:rPr lang="en-US" sz="1100" dirty="0" smtClean="0"/>
+              <a:rPr lang="en-US" sz="2000" dirty="0" smtClean="0"/>
               <a:t>used cases</a:t>
             </a:r>
           </a:p>
@@ -3260,11 +3582,11 @@
               </a:lnSpc>
             </a:pPr>
             <a:r>
-              <a:rPr lang="en-US" sz="1100" dirty="0" smtClean="0"/>
+              <a:rPr lang="en-US" sz="2000" dirty="0" smtClean="0"/>
               <a:t>Data </a:t>
             </a:r>
             <a:r>
-              <a:rPr lang="en-US" sz="1100" dirty="0">
+              <a:rPr lang="en-US" sz="2000" dirty="0">
                 <a:solidFill>
                   <a:schemeClr val="accent2">
                     <a:lumMod val="75000"/>
@@ -3274,11 +3596,11 @@
               <a:t>authenticity, confidentiality, ready, and integrity </a:t>
             </a:r>
             <a:r>
-              <a:rPr lang="en-US" sz="1100" dirty="0"/>
+              <a:rPr lang="en-US" sz="2000" dirty="0"/>
               <a:t>for </a:t>
             </a:r>
             <a:r>
-              <a:rPr lang="en-US" sz="1100" dirty="0" smtClean="0"/>
+              <a:rPr lang="en-US" sz="2000" dirty="0" smtClean="0"/>
               <a:t>real time applications</a:t>
             </a:r>
           </a:p>
@@ -3289,15 +3611,15 @@
               </a:lnSpc>
             </a:pPr>
             <a:r>
-              <a:rPr lang="en-US" sz="1100" dirty="0" smtClean="0"/>
+              <a:rPr lang="en-US" sz="2000" dirty="0" smtClean="0"/>
               <a:t>The </a:t>
             </a:r>
             <a:r>
-              <a:rPr lang="en-US" sz="1100" dirty="0"/>
+              <a:rPr lang="en-US" sz="2000" dirty="0"/>
               <a:t>expectation of users </a:t>
             </a:r>
             <a:r>
-              <a:rPr lang="en-US" sz="1100" dirty="0">
+              <a:rPr lang="en-US" sz="2000" dirty="0">
                 <a:solidFill>
                   <a:srgbClr val="C00000"/>
                 </a:solidFill>
@@ -3305,7 +3627,7 @@
               <a:t>for huge amount of objects </a:t>
             </a:r>
             <a:r>
-              <a:rPr lang="en-US" sz="1100" dirty="0"/>
+              <a:rPr lang="en-US" sz="2000" dirty="0"/>
               <a:t>to search among</a:t>
             </a:r>
           </a:p>
@@ -3315,22 +3637,11 @@
                 <a:spcPct val="170000"/>
               </a:lnSpc>
             </a:pPr>
-            <a:r>
-              <a:rPr lang="en-US" sz="1100" dirty="0" smtClean="0"/>
-              <a:t>Sometimes </a:t>
-            </a:r>
-            <a:r>
-              <a:rPr lang="en-US" sz="1100" dirty="0">
-                <a:solidFill>
-                  <a:srgbClr val="00B0F0"/>
-                </a:solidFill>
-              </a:rPr>
-              <a:t>incompleteness query specification </a:t>
-            </a:r>
-            <a:r>
-              <a:rPr lang="en-US" sz="1100" dirty="0"/>
-              <a:t>seems to be a challenge</a:t>
-            </a:r>
+            <a:endParaRPr lang="en-US" sz="2000" dirty="0" smtClean="0">
+              <a:solidFill>
+                <a:srgbClr val="002060"/>
+              </a:solidFill>
+            </a:endParaRPr>
           </a:p>
           <a:p>
             <a:pPr algn="just">
@@ -3338,169 +3649,7 @@
                 <a:spcPct val="170000"/>
               </a:lnSpc>
             </a:pPr>
-            <a:r>
-              <a:rPr lang="en-US" sz="1100" dirty="0" smtClean="0">
-                <a:solidFill>
-                  <a:srgbClr val="FF0000"/>
-                </a:solidFill>
-              </a:rPr>
-              <a:t>Incomplete </a:t>
-            </a:r>
-            <a:r>
-              <a:rPr lang="en-US" sz="1100" dirty="0">
-                <a:solidFill>
-                  <a:srgbClr val="FF0000"/>
-                </a:solidFill>
-              </a:rPr>
-              <a:t>image </a:t>
-            </a:r>
-            <a:r>
-              <a:rPr lang="en-US" sz="1100" dirty="0"/>
-              <a:t>description is also a </a:t>
-            </a:r>
-            <a:r>
-              <a:rPr lang="en-US" sz="1100" dirty="0" smtClean="0"/>
-              <a:t>source </a:t>
-            </a:r>
-            <a:r>
-              <a:rPr lang="en-US" sz="1100" dirty="0"/>
-              <a:t>of challenge to an efficient CBIR </a:t>
-            </a:r>
-            <a:r>
-              <a:rPr lang="en-US" sz="1100" dirty="0" smtClean="0"/>
-              <a:t>system</a:t>
-            </a:r>
-          </a:p>
-          <a:p>
-            <a:pPr algn="just">
-              <a:lnSpc>
-                <a:spcPct val="170000"/>
-              </a:lnSpc>
-            </a:pPr>
-            <a:r>
-              <a:rPr lang="en-US" sz="1100" dirty="0" smtClean="0"/>
-              <a:t>The issue related to the semantic gap where it means </a:t>
-            </a:r>
-            <a:r>
-              <a:rPr lang="en-US" sz="1100" dirty="0" smtClean="0">
-                <a:solidFill>
-                  <a:srgbClr val="00B050"/>
-                </a:solidFill>
-              </a:rPr>
-              <a:t>the lack of coincidence </a:t>
-            </a:r>
-            <a:r>
-              <a:rPr lang="en-US" sz="1100" dirty="0" smtClean="0"/>
-              <a:t>between information that the same data have for a user in a given situation</a:t>
-            </a:r>
-          </a:p>
-          <a:p>
-            <a:pPr algn="just">
-              <a:lnSpc>
-                <a:spcPct val="170000"/>
-              </a:lnSpc>
-            </a:pPr>
-            <a:r>
-              <a:rPr lang="en-US" sz="1100" dirty="0">
-                <a:solidFill>
-                  <a:srgbClr val="0070C0"/>
-                </a:solidFill>
-              </a:rPr>
-              <a:t>Updating meta-data</a:t>
-            </a:r>
-            <a:r>
-              <a:rPr lang="en-US" sz="1100" dirty="0"/>
-              <a:t> based on the collected information from each node ( user</a:t>
-            </a:r>
-            <a:r>
-              <a:rPr lang="en-US" sz="1100" dirty="0" smtClean="0"/>
-              <a:t>)</a:t>
-            </a:r>
-          </a:p>
-          <a:p>
-            <a:pPr algn="just">
-              <a:lnSpc>
-                <a:spcPct val="170000"/>
-              </a:lnSpc>
-            </a:pPr>
-            <a:r>
-              <a:rPr lang="en-US" sz="1100" dirty="0" smtClean="0"/>
-              <a:t>How to recognize the object with its’ </a:t>
-            </a:r>
-            <a:r>
-              <a:rPr lang="en-US" sz="1100" b="1" dirty="0" smtClean="0"/>
-              <a:t>rotation-invariant</a:t>
-            </a:r>
-          </a:p>
-          <a:p>
-            <a:pPr algn="just">
-              <a:lnSpc>
-                <a:spcPct val="170000"/>
-              </a:lnSpc>
-            </a:pPr>
-            <a:r>
-              <a:rPr lang="en-US" sz="1100" dirty="0"/>
-              <a:t>How to recognize the object with </a:t>
-            </a:r>
-            <a:r>
-              <a:rPr lang="en-US" sz="1100" dirty="0">
-                <a:solidFill>
-                  <a:srgbClr val="FF0000"/>
-                </a:solidFill>
-              </a:rPr>
-              <a:t>any angle direction </a:t>
-            </a:r>
-            <a:r>
-              <a:rPr lang="en-US" sz="1100" dirty="0" smtClean="0"/>
-              <a:t>of user’s view?</a:t>
-            </a:r>
-          </a:p>
-          <a:p>
-            <a:pPr algn="just">
-              <a:lnSpc>
-                <a:spcPct val="170000"/>
-              </a:lnSpc>
-            </a:pPr>
-            <a:r>
-              <a:rPr lang="en-US" sz="1100" dirty="0"/>
-              <a:t>How to recognize an object in spite of the</a:t>
-            </a:r>
-            <a:r>
-              <a:rPr lang="en-US" sz="1100" dirty="0">
-                <a:solidFill>
-                  <a:srgbClr val="002060"/>
-                </a:solidFill>
-              </a:rPr>
-              <a:t> partially obscured one</a:t>
-            </a:r>
-            <a:r>
-              <a:rPr lang="en-US" sz="1100" dirty="0" smtClean="0">
-                <a:solidFill>
-                  <a:srgbClr val="002060"/>
-                </a:solidFill>
-              </a:rPr>
-              <a:t>?</a:t>
-            </a:r>
-          </a:p>
-          <a:p>
-            <a:pPr algn="just">
-              <a:lnSpc>
-                <a:spcPct val="170000"/>
-              </a:lnSpc>
-            </a:pPr>
-            <a:endParaRPr lang="en-US" sz="1100" dirty="0" smtClean="0">
-              <a:solidFill>
-                <a:srgbClr val="002060"/>
-              </a:solidFill>
-            </a:endParaRPr>
-          </a:p>
-          <a:p>
-            <a:pPr algn="just">
-              <a:lnSpc>
-                <a:spcPct val="170000"/>
-              </a:lnSpc>
-            </a:pPr>
-            <a:endParaRPr lang="en-US" sz="1100" dirty="0">
+            <a:endParaRPr lang="en-US" sz="2000" dirty="0">
               <a:solidFill>
                 <a:srgbClr val="002060"/>
               </a:solidFill>
@@ -3518,10 +3667,243 @@
   <p:clrMapOvr>
     <a:masterClrMapping/>
   </p:clrMapOvr>
+  <p:timing>
+    <p:tnLst>
+      <p:par>
+        <p:cTn id="1" dur="indefinite" restart="never" nodeType="tmRoot"/>
+      </p:par>
+    </p:tnLst>
+  </p:timing>
 </p:sld>
 </file>
 
-<file path=ppt/slides/slide12.xml><?xml version="1.0" encoding="utf-8"?>
+<file path=ppt/slides/slide13.xml><?xml version="1.0" encoding="utf-8"?>
+<p:sld xmlns:a="http://schemas.openxmlformats.org/drawingml/2006/main" xmlns:r="http://schemas.openxmlformats.org/officeDocument/2006/relationships" xmlns:p="http://schemas.openxmlformats.org/presentationml/2006/main">
+  <p:cSld>
+    <p:spTree>
+      <p:nvGrpSpPr>
+        <p:cNvPr id="1" name=""/>
+        <p:cNvGrpSpPr/>
+        <p:nvPr/>
+      </p:nvGrpSpPr>
+      <p:grpSpPr>
+        <a:xfrm>
+          <a:off x="0" y="0"/>
+          <a:ext cx="0" cy="0"/>
+          <a:chOff x="0" y="0"/>
+          <a:chExt cx="0" cy="0"/>
+        </a:xfrm>
+      </p:grpSpPr>
+      <p:sp>
+        <p:nvSpPr>
+          <p:cNvPr id="2" name="Title 1"/>
+          <p:cNvSpPr>
+            <a:spLocks noGrp="1"/>
+          </p:cNvSpPr>
+          <p:nvPr>
+            <p:ph type="title"/>
+          </p:nvPr>
+        </p:nvSpPr>
+        <p:spPr/>
+        <p:txBody>
+          <a:bodyPr/>
+          <a:lstStyle/>
+          <a:p>
+            <a:r>
+              <a:rPr lang="en-US" dirty="0"/>
+              <a:t>Challenges</a:t>
+            </a:r>
+          </a:p>
+        </p:txBody>
+      </p:sp>
+      <p:sp>
+        <p:nvSpPr>
+          <p:cNvPr id="3" name="Content Placeholder 2"/>
+          <p:cNvSpPr>
+            <a:spLocks noGrp="1"/>
+          </p:cNvSpPr>
+          <p:nvPr>
+            <p:ph idx="1"/>
+          </p:nvPr>
+        </p:nvSpPr>
+        <p:spPr/>
+        <p:txBody>
+          <a:bodyPr>
+            <a:noAutofit/>
+          </a:bodyPr>
+          <a:lstStyle/>
+          <a:p>
+            <a:pPr algn="just">
+              <a:lnSpc>
+                <a:spcPct val="170000"/>
+              </a:lnSpc>
+            </a:pPr>
+            <a:r>
+              <a:rPr lang="en-US" sz="1600" dirty="0"/>
+              <a:t>Sometimes </a:t>
+            </a:r>
+            <a:r>
+              <a:rPr lang="en-US" sz="1600" b="1" dirty="0">
+                <a:solidFill>
+                  <a:srgbClr val="00B0F0"/>
+                </a:solidFill>
+              </a:rPr>
+              <a:t>incompleteness query specification </a:t>
+            </a:r>
+            <a:r>
+              <a:rPr lang="en-US" sz="1600" dirty="0"/>
+              <a:t>seems to be a challenge</a:t>
+            </a:r>
+          </a:p>
+          <a:p>
+            <a:pPr algn="just">
+              <a:lnSpc>
+                <a:spcPct val="170000"/>
+              </a:lnSpc>
+            </a:pPr>
+            <a:r>
+              <a:rPr lang="en-US" sz="1600" b="1" dirty="0">
+                <a:solidFill>
+                  <a:srgbClr val="FF0000"/>
+                </a:solidFill>
+              </a:rPr>
+              <a:t>Incomplete image </a:t>
+            </a:r>
+            <a:r>
+              <a:rPr lang="en-US" sz="1600" dirty="0"/>
+              <a:t>description is also a source of challenge to an efficient CBIR system</a:t>
+            </a:r>
+          </a:p>
+          <a:p>
+            <a:pPr algn="just">
+              <a:lnSpc>
+                <a:spcPct val="170000"/>
+              </a:lnSpc>
+            </a:pPr>
+            <a:r>
+              <a:rPr lang="en-US" sz="1600" dirty="0"/>
+              <a:t>The issue related to the semantic gap where it means </a:t>
+            </a:r>
+            <a:r>
+              <a:rPr lang="en-US" sz="1600" b="1" dirty="0">
+                <a:solidFill>
+                  <a:srgbClr val="00B050"/>
+                </a:solidFill>
+              </a:rPr>
+              <a:t>the lack of coincidence </a:t>
+            </a:r>
+            <a:r>
+              <a:rPr lang="en-US" sz="1600" dirty="0"/>
+              <a:t>between information that the same data have for a user in a given situation</a:t>
+            </a:r>
+          </a:p>
+          <a:p>
+            <a:pPr algn="just">
+              <a:lnSpc>
+                <a:spcPct val="170000"/>
+              </a:lnSpc>
+            </a:pPr>
+            <a:r>
+              <a:rPr lang="en-US" sz="1600" b="1" dirty="0">
+                <a:solidFill>
+                  <a:srgbClr val="0070C0"/>
+                </a:solidFill>
+              </a:rPr>
+              <a:t>Updating meta-data</a:t>
+            </a:r>
+            <a:r>
+              <a:rPr lang="en-US" sz="1600" b="1" dirty="0"/>
+              <a:t> </a:t>
+            </a:r>
+            <a:r>
+              <a:rPr lang="en-US" sz="1600" dirty="0"/>
+              <a:t>based on the collected information from each node ( user)</a:t>
+            </a:r>
+          </a:p>
+          <a:p>
+            <a:pPr algn="just">
+              <a:lnSpc>
+                <a:spcPct val="170000"/>
+              </a:lnSpc>
+            </a:pPr>
+            <a:r>
+              <a:rPr lang="en-US" sz="1600" dirty="0"/>
+              <a:t>How to recognize the object with </a:t>
+            </a:r>
+            <a:r>
+              <a:rPr lang="en-US" sz="1600" b="1" dirty="0"/>
+              <a:t>its’ rotation-invariant</a:t>
+            </a:r>
+          </a:p>
+          <a:p>
+            <a:pPr algn="just">
+              <a:lnSpc>
+                <a:spcPct val="170000"/>
+              </a:lnSpc>
+            </a:pPr>
+            <a:r>
+              <a:rPr lang="en-US" sz="1600" dirty="0"/>
+              <a:t>How to recognize the object with </a:t>
+            </a:r>
+            <a:r>
+              <a:rPr lang="en-US" sz="1600" b="1" dirty="0">
+                <a:solidFill>
+                  <a:srgbClr val="FF0000"/>
+                </a:solidFill>
+              </a:rPr>
+              <a:t>any angle direction </a:t>
+            </a:r>
+            <a:r>
+              <a:rPr lang="en-US" sz="1600" dirty="0"/>
+              <a:t>of user’s view?</a:t>
+            </a:r>
+          </a:p>
+          <a:p>
+            <a:pPr algn="just">
+              <a:lnSpc>
+                <a:spcPct val="170000"/>
+              </a:lnSpc>
+            </a:pPr>
+            <a:r>
+              <a:rPr lang="en-US" sz="1600" dirty="0"/>
+              <a:t>How to recognize an object in spite of the</a:t>
+            </a:r>
+            <a:r>
+              <a:rPr lang="en-US" sz="1600" dirty="0">
+                <a:solidFill>
+                  <a:srgbClr val="002060"/>
+                </a:solidFill>
+              </a:rPr>
+              <a:t> </a:t>
+            </a:r>
+            <a:r>
+              <a:rPr lang="en-US" sz="1600" b="1" dirty="0">
+                <a:solidFill>
+                  <a:srgbClr val="002060"/>
+                </a:solidFill>
+              </a:rPr>
+              <a:t>partially obscured one?</a:t>
+            </a:r>
+          </a:p>
+          <a:p>
+            <a:endParaRPr lang="en-US" sz="1600" b="1" dirty="0"/>
+          </a:p>
+        </p:txBody>
+      </p:sp>
+    </p:spTree>
+    <p:extLst>
+      <p:ext uri="{BB962C8B-B14F-4D97-AF65-F5344CB8AC3E}">
+        <p14:creationId xmlns:p14="http://schemas.microsoft.com/office/powerpoint/2010/main" val="2670723839"/>
+      </p:ext>
+    </p:extLst>
+  </p:cSld>
+  <p:clrMapOvr>
+    <a:masterClrMapping/>
+  </p:clrMapOvr>
+</p:sld>
+</file>
+
+<file path=ppt/slides/slide14.xml><?xml version="1.0" encoding="utf-8"?>
 <p:sld xmlns:a="http://schemas.openxmlformats.org/drawingml/2006/main" xmlns:r="http://schemas.openxmlformats.org/officeDocument/2006/relationships" xmlns:p="http://schemas.openxmlformats.org/presentationml/2006/main" showMasterSp="0">
   <p:cSld>
     <p:spTree>
@@ -4051,243 +4433,6 @@
     <p:extLst>
       <p:ext uri="{BB962C8B-B14F-4D97-AF65-F5344CB8AC3E}">
         <p14:creationId xmlns:p14="http://schemas.microsoft.com/office/powerpoint/2010/main" val="991377956"/>
-      </p:ext>
-    </p:extLst>
-  </p:cSld>
-  <p:clrMapOvr>
-    <a:masterClrMapping/>
-  </p:clrMapOvr>
-</p:sld>
-</file>
-
-<file path=ppt/slides/slide13.xml><?xml version="1.0" encoding="utf-8"?>
-<p:sld xmlns:a="http://schemas.openxmlformats.org/drawingml/2006/main" xmlns:r="http://schemas.openxmlformats.org/officeDocument/2006/relationships" xmlns:p="http://schemas.openxmlformats.org/presentationml/2006/main">
-  <p:cSld>
-    <p:spTree>
-      <p:nvGrpSpPr>
-        <p:cNvPr id="1" name=""/>
-        <p:cNvGrpSpPr/>
-        <p:nvPr/>
-      </p:nvGrpSpPr>
-      <p:grpSpPr>
-        <a:xfrm>
-          <a:off x="0" y="0"/>
-          <a:ext cx="0" cy="0"/>
-          <a:chOff x="0" y="0"/>
-          <a:chExt cx="0" cy="0"/>
-        </a:xfrm>
-      </p:grpSpPr>
-      <p:sp>
-        <p:nvSpPr>
-          <p:cNvPr id="2" name="Title 1"/>
-          <p:cNvSpPr>
-            <a:spLocks noGrp="1"/>
-          </p:cNvSpPr>
-          <p:nvPr>
-            <p:ph type="title"/>
-          </p:nvPr>
-        </p:nvSpPr>
-        <p:spPr/>
-        <p:txBody>
-          <a:bodyPr/>
-          <a:lstStyle/>
-          <a:p>
-            <a:r>
-              <a:rPr lang="en-US" dirty="0" smtClean="0"/>
-              <a:t>Contributions</a:t>
-            </a:r>
-            <a:endParaRPr lang="en-US" dirty="0"/>
-          </a:p>
-        </p:txBody>
-      </p:sp>
-      <p:sp>
-        <p:nvSpPr>
-          <p:cNvPr id="3" name="Content Placeholder 2"/>
-          <p:cNvSpPr>
-            <a:spLocks noGrp="1"/>
-          </p:cNvSpPr>
-          <p:nvPr>
-            <p:ph idx="1"/>
-          </p:nvPr>
-        </p:nvSpPr>
-        <p:spPr/>
-        <p:txBody>
-          <a:bodyPr/>
-          <a:lstStyle/>
-          <a:p>
-            <a:r>
-              <a:rPr lang="en-US" dirty="0" smtClean="0"/>
-              <a:t>Performance:</a:t>
-            </a:r>
-          </a:p>
-          <a:p>
-            <a:pPr lvl="1">
-              <a:buFont typeface="Wingdings" panose="05000000000000000000" pitchFamily="2" charset="2"/>
-              <a:buChar char="ü"/>
-            </a:pPr>
-            <a:r>
-              <a:rPr lang="en-US" dirty="0" smtClean="0"/>
-              <a:t> Geo-information: geo-location and hashtag information</a:t>
-            </a:r>
-          </a:p>
-          <a:p>
-            <a:pPr marL="457200" lvl="1" indent="0">
-              <a:buNone/>
-            </a:pPr>
-            <a:r>
-              <a:rPr lang="en-US" dirty="0" smtClean="0"/>
-              <a:t> </a:t>
-            </a:r>
-          </a:p>
-        </p:txBody>
-      </p:sp>
-      <p:pic>
-        <p:nvPicPr>
-          <p:cNvPr id="5" name="Picture 4"/>
-          <p:cNvPicPr>
-            <a:picLocks noChangeAspect="1"/>
-          </p:cNvPicPr>
-          <p:nvPr/>
-        </p:nvPicPr>
-        <p:blipFill>
-          <a:blip r:embed="rId2"/>
-          <a:stretch>
-            <a:fillRect/>
-          </a:stretch>
-        </p:blipFill>
-        <p:spPr>
-          <a:xfrm>
-            <a:off x="4851400" y="2776340"/>
-            <a:ext cx="5141181" cy="3713360"/>
-          </a:xfrm>
-          <a:prstGeom prst="rect">
-            <a:avLst/>
-          </a:prstGeom>
-        </p:spPr>
-      </p:pic>
-    </p:spTree>
-    <p:extLst>
-      <p:ext uri="{BB962C8B-B14F-4D97-AF65-F5344CB8AC3E}">
-        <p14:creationId xmlns:p14="http://schemas.microsoft.com/office/powerpoint/2010/main" val="510729355"/>
-      </p:ext>
-    </p:extLst>
-  </p:cSld>
-  <p:clrMapOvr>
-    <a:masterClrMapping/>
-  </p:clrMapOvr>
-</p:sld>
-</file>
-
-<file path=ppt/slides/slide14.xml><?xml version="1.0" encoding="utf-8"?>
-<p:sld xmlns:a="http://schemas.openxmlformats.org/drawingml/2006/main" xmlns:r="http://schemas.openxmlformats.org/officeDocument/2006/relationships" xmlns:p="http://schemas.openxmlformats.org/presentationml/2006/main">
-  <p:cSld>
-    <p:spTree>
-      <p:nvGrpSpPr>
-        <p:cNvPr id="1" name=""/>
-        <p:cNvGrpSpPr/>
-        <p:nvPr/>
-      </p:nvGrpSpPr>
-      <p:grpSpPr>
-        <a:xfrm>
-          <a:off x="0" y="0"/>
-          <a:ext cx="0" cy="0"/>
-          <a:chOff x="0" y="0"/>
-          <a:chExt cx="0" cy="0"/>
-        </a:xfrm>
-      </p:grpSpPr>
-      <p:sp>
-        <p:nvSpPr>
-          <p:cNvPr id="2" name="Title 1"/>
-          <p:cNvSpPr>
-            <a:spLocks noGrp="1"/>
-          </p:cNvSpPr>
-          <p:nvPr>
-            <p:ph type="title"/>
-          </p:nvPr>
-        </p:nvSpPr>
-        <p:spPr/>
-        <p:txBody>
-          <a:bodyPr/>
-          <a:lstStyle/>
-          <a:p>
-            <a:r>
-              <a:rPr lang="en-US" dirty="0" smtClean="0"/>
-              <a:t>Contributions</a:t>
-            </a:r>
-            <a:endParaRPr lang="en-US" dirty="0"/>
-          </a:p>
-        </p:txBody>
-      </p:sp>
-      <p:sp>
-        <p:nvSpPr>
-          <p:cNvPr id="3" name="Content Placeholder 2"/>
-          <p:cNvSpPr>
-            <a:spLocks noGrp="1"/>
-          </p:cNvSpPr>
-          <p:nvPr>
-            <p:ph idx="1"/>
-          </p:nvPr>
-        </p:nvSpPr>
-        <p:spPr/>
-        <p:txBody>
-          <a:bodyPr/>
-          <a:lstStyle/>
-          <a:p>
-            <a:r>
-              <a:rPr lang="en-US" dirty="0" smtClean="0"/>
-              <a:t>Accuracy:</a:t>
-            </a:r>
-          </a:p>
-          <a:p>
-            <a:pPr lvl="1">
-              <a:buFont typeface="Wingdings" panose="05000000000000000000" pitchFamily="2" charset="2"/>
-              <a:buChar char="ü"/>
-            </a:pPr>
-            <a:r>
-              <a:rPr lang="en-US" smtClean="0"/>
-              <a:t>Private </a:t>
-            </a:r>
-            <a:r>
-              <a:rPr lang="en-US" dirty="0" smtClean="0"/>
-              <a:t>(Semantic) features</a:t>
-            </a:r>
-          </a:p>
-          <a:p>
-            <a:pPr lvl="1">
-              <a:buFont typeface="Wingdings" panose="05000000000000000000" pitchFamily="2" charset="2"/>
-              <a:buChar char="ü"/>
-            </a:pPr>
-            <a:r>
-              <a:rPr lang="en-US" dirty="0" smtClean="0"/>
-              <a:t>Style features</a:t>
-            </a:r>
-          </a:p>
-          <a:p>
-            <a:pPr lvl="1">
-              <a:buFont typeface="Wingdings" panose="05000000000000000000" pitchFamily="2" charset="2"/>
-              <a:buChar char="ü"/>
-            </a:pPr>
-            <a:r>
-              <a:rPr lang="en-US" dirty="0" smtClean="0"/>
-              <a:t>Guessing features</a:t>
-            </a:r>
-          </a:p>
-          <a:p>
-            <a:pPr marL="0" indent="0">
-              <a:buNone/>
-            </a:pPr>
-            <a:r>
-              <a:rPr lang="en-US" dirty="0" smtClean="0"/>
-              <a:t>	</a:t>
-            </a:r>
-            <a:endParaRPr lang="en-US" dirty="0"/>
-          </a:p>
-        </p:txBody>
-      </p:sp>
-    </p:spTree>
-    <p:extLst>
-      <p:ext uri="{BB962C8B-B14F-4D97-AF65-F5344CB8AC3E}">
-        <p14:creationId xmlns:p14="http://schemas.microsoft.com/office/powerpoint/2010/main" val="2676345400"/>
       </p:ext>
     </p:extLst>
   </p:cSld>
@@ -4337,9 +4482,50 @@
           </a:p>
         </p:txBody>
       </p:sp>
+      <p:sp>
+        <p:nvSpPr>
+          <p:cNvPr id="3" name="Content Placeholder 2"/>
+          <p:cNvSpPr>
+            <a:spLocks noGrp="1"/>
+          </p:cNvSpPr>
+          <p:nvPr>
+            <p:ph idx="1"/>
+          </p:nvPr>
+        </p:nvSpPr>
+        <p:spPr/>
+        <p:txBody>
+          <a:bodyPr/>
+          <a:lstStyle/>
+          <a:p>
+            <a:r>
+              <a:rPr lang="en-US" dirty="0" smtClean="0"/>
+              <a:t>Performance:</a:t>
+            </a:r>
+          </a:p>
+          <a:p>
+            <a:pPr lvl="1">
+              <a:buFont typeface="Wingdings" panose="05000000000000000000" pitchFamily="2" charset="2"/>
+              <a:buChar char="ü"/>
+            </a:pPr>
+            <a:r>
+              <a:rPr lang="en-US" dirty="0" smtClean="0"/>
+              <a:t> Geo-information: geo-location and hashtag information</a:t>
+            </a:r>
+          </a:p>
+          <a:p>
+            <a:pPr marL="457200" lvl="1" indent="0">
+              <a:buNone/>
+            </a:pPr>
+            <a:r>
+              <a:rPr lang="en-US" dirty="0" smtClean="0"/>
+              <a:t> </a:t>
+            </a:r>
+          </a:p>
+        </p:txBody>
+      </p:sp>
       <p:pic>
         <p:nvPicPr>
-          <p:cNvPr id="4" name="Picture 3"/>
+          <p:cNvPr id="5" name="Picture 4"/>
           <p:cNvPicPr>
             <a:picLocks noChangeAspect="1"/>
           </p:cNvPicPr>
@@ -4353,8 +4539,8 @@
         </p:blipFill>
         <p:spPr>
           <a:xfrm>
-            <a:off x="4300500" y="1562451"/>
-            <a:ext cx="6530060" cy="4869973"/>
+            <a:off x="4851400" y="2776340"/>
+            <a:ext cx="5141181" cy="3713360"/>
           </a:xfrm>
           <a:prstGeom prst="rect">
             <a:avLst/>
@@ -4364,7 +4550,7 @@
     </p:spTree>
     <p:extLst>
       <p:ext uri="{BB962C8B-B14F-4D97-AF65-F5344CB8AC3E}">
-        <p14:creationId xmlns:p14="http://schemas.microsoft.com/office/powerpoint/2010/main" val="3131850597"/>
+        <p14:creationId xmlns:p14="http://schemas.microsoft.com/office/powerpoint/2010/main" val="510729355"/>
       </p:ext>
     </p:extLst>
   </p:cSld>
@@ -4408,7 +4594,7 @@
           <a:p>
             <a:r>
               <a:rPr lang="en-US" dirty="0" smtClean="0"/>
-              <a:t>Contribution</a:t>
+              <a:t>Contributions</a:t>
             </a:r>
             <a:endParaRPr lang="en-US" dirty="0"/>
           </a:p>
@@ -4431,7 +4617,7 @@
           <a:p>
             <a:r>
               <a:rPr lang="en-US" dirty="0" smtClean="0"/>
-              <a:t>Visualize the artwork features:</a:t>
+              <a:t>Accuracy:</a:t>
             </a:r>
           </a:p>
           <a:p>
@@ -4440,8 +4626,12 @@
               <a:buChar char="ü"/>
             </a:pPr>
             <a:r>
+              <a:rPr lang="en-US" smtClean="0"/>
+              <a:t>Private </a:t>
+            </a:r>
+            <a:r>
               <a:rPr lang="en-US" dirty="0" smtClean="0"/>
-              <a:t> Generate the holographic object</a:t>
+              <a:t>(Semantic) features</a:t>
             </a:r>
           </a:p>
           <a:p>
@@ -4451,7 +4641,7 @@
             </a:pPr>
             <a:r>
               <a:rPr lang="en-US" dirty="0" smtClean="0"/>
-              <a:t> Generate the augmented reality display</a:t>
+              <a:t>Style features</a:t>
             </a:r>
           </a:p>
           <a:p>
@@ -4460,22 +4650,18 @@
               <a:buChar char="ü"/>
             </a:pPr>
             <a:r>
-              <a:rPr lang="en-US" dirty="0"/>
-              <a:t> </a:t>
-            </a:r>
-            <a:r>
               <a:rPr lang="en-US" dirty="0" smtClean="0"/>
-              <a:t>Generate the virtual reality display</a:t>
-            </a:r>
-          </a:p>
-          <a:p>
-            <a:pPr lvl="1"/>
-            <a:endParaRPr lang="en-US" dirty="0" smtClean="0"/>
+              <a:t>Guessing features</a:t>
+            </a:r>
           </a:p>
           <a:p>
             <a:pPr marL="0" indent="0">
               <a:buNone/>
             </a:pPr>
+            <a:r>
+              <a:rPr lang="en-US" dirty="0" smtClean="0"/>
+              <a:t>	</a:t>
+            </a:r>
             <a:endParaRPr lang="en-US" dirty="0"/>
           </a:p>
         </p:txBody>
@@ -4483,7 +4669,7 @@
     </p:spTree>
     <p:extLst>
       <p:ext uri="{BB962C8B-B14F-4D97-AF65-F5344CB8AC3E}">
-        <p14:creationId xmlns:p14="http://schemas.microsoft.com/office/powerpoint/2010/main" val="2345528951"/>
+        <p14:creationId xmlns:p14="http://schemas.microsoft.com/office/powerpoint/2010/main" val="2676345400"/>
       </p:ext>
     </p:extLst>
   </p:cSld>
@@ -4549,6 +4735,202 @@
         </p:blipFill>
         <p:spPr>
           <a:xfrm>
+            <a:off x="4300500" y="1562451"/>
+            <a:ext cx="6530060" cy="4869973"/>
+          </a:xfrm>
+          <a:prstGeom prst="rect">
+            <a:avLst/>
+          </a:prstGeom>
+        </p:spPr>
+      </p:pic>
+    </p:spTree>
+    <p:extLst>
+      <p:ext uri="{BB962C8B-B14F-4D97-AF65-F5344CB8AC3E}">
+        <p14:creationId xmlns:p14="http://schemas.microsoft.com/office/powerpoint/2010/main" val="3131850597"/>
+      </p:ext>
+    </p:extLst>
+  </p:cSld>
+  <p:clrMapOvr>
+    <a:masterClrMapping/>
+  </p:clrMapOvr>
+</p:sld>
+</file>
+
+<file path=ppt/slides/slide18.xml><?xml version="1.0" encoding="utf-8"?>
+<p:sld xmlns:a="http://schemas.openxmlformats.org/drawingml/2006/main" xmlns:r="http://schemas.openxmlformats.org/officeDocument/2006/relationships" xmlns:p="http://schemas.openxmlformats.org/presentationml/2006/main">
+  <p:cSld>
+    <p:spTree>
+      <p:nvGrpSpPr>
+        <p:cNvPr id="1" name=""/>
+        <p:cNvGrpSpPr/>
+        <p:nvPr/>
+      </p:nvGrpSpPr>
+      <p:grpSpPr>
+        <a:xfrm>
+          <a:off x="0" y="0"/>
+          <a:ext cx="0" cy="0"/>
+          <a:chOff x="0" y="0"/>
+          <a:chExt cx="0" cy="0"/>
+        </a:xfrm>
+      </p:grpSpPr>
+      <p:sp>
+        <p:nvSpPr>
+          <p:cNvPr id="2" name="Title 1"/>
+          <p:cNvSpPr>
+            <a:spLocks noGrp="1"/>
+          </p:cNvSpPr>
+          <p:nvPr>
+            <p:ph type="title"/>
+          </p:nvPr>
+        </p:nvSpPr>
+        <p:spPr/>
+        <p:txBody>
+          <a:bodyPr/>
+          <a:lstStyle/>
+          <a:p>
+            <a:r>
+              <a:rPr lang="en-US" dirty="0" smtClean="0"/>
+              <a:t>Contribution</a:t>
+            </a:r>
+            <a:endParaRPr lang="en-US" dirty="0"/>
+          </a:p>
+        </p:txBody>
+      </p:sp>
+      <p:sp>
+        <p:nvSpPr>
+          <p:cNvPr id="3" name="Content Placeholder 2"/>
+          <p:cNvSpPr>
+            <a:spLocks noGrp="1"/>
+          </p:cNvSpPr>
+          <p:nvPr>
+            <p:ph idx="1"/>
+          </p:nvPr>
+        </p:nvSpPr>
+        <p:spPr/>
+        <p:txBody>
+          <a:bodyPr/>
+          <a:lstStyle/>
+          <a:p>
+            <a:r>
+              <a:rPr lang="en-US" dirty="0" smtClean="0"/>
+              <a:t>Visualize the artwork features:</a:t>
+            </a:r>
+          </a:p>
+          <a:p>
+            <a:pPr lvl="1">
+              <a:buFont typeface="Wingdings" panose="05000000000000000000" pitchFamily="2" charset="2"/>
+              <a:buChar char="ü"/>
+            </a:pPr>
+            <a:r>
+              <a:rPr lang="en-US" dirty="0" smtClean="0"/>
+              <a:t> Generate the holographic object</a:t>
+            </a:r>
+          </a:p>
+          <a:p>
+            <a:pPr lvl="1">
+              <a:buFont typeface="Wingdings" panose="05000000000000000000" pitchFamily="2" charset="2"/>
+              <a:buChar char="ü"/>
+            </a:pPr>
+            <a:r>
+              <a:rPr lang="en-US" dirty="0" smtClean="0"/>
+              <a:t> Generate the augmented reality display</a:t>
+            </a:r>
+          </a:p>
+          <a:p>
+            <a:pPr lvl="1">
+              <a:buFont typeface="Wingdings" panose="05000000000000000000" pitchFamily="2" charset="2"/>
+              <a:buChar char="ü"/>
+            </a:pPr>
+            <a:r>
+              <a:rPr lang="en-US" dirty="0"/>
+              <a:t> </a:t>
+            </a:r>
+            <a:r>
+              <a:rPr lang="en-US" dirty="0" smtClean="0"/>
+              <a:t>Generate the virtual reality display</a:t>
+            </a:r>
+          </a:p>
+          <a:p>
+            <a:pPr lvl="1"/>
+            <a:endParaRPr lang="en-US" dirty="0" smtClean="0"/>
+          </a:p>
+          <a:p>
+            <a:pPr marL="0" indent="0">
+              <a:buNone/>
+            </a:pPr>
+            <a:endParaRPr lang="en-US" dirty="0"/>
+          </a:p>
+        </p:txBody>
+      </p:sp>
+    </p:spTree>
+    <p:extLst>
+      <p:ext uri="{BB962C8B-B14F-4D97-AF65-F5344CB8AC3E}">
+        <p14:creationId xmlns:p14="http://schemas.microsoft.com/office/powerpoint/2010/main" val="2345528951"/>
+      </p:ext>
+    </p:extLst>
+  </p:cSld>
+  <p:clrMapOvr>
+    <a:masterClrMapping/>
+  </p:clrMapOvr>
+</p:sld>
+</file>
+
+<file path=ppt/slides/slide19.xml><?xml version="1.0" encoding="utf-8"?>
+<p:sld xmlns:a="http://schemas.openxmlformats.org/drawingml/2006/main" xmlns:r="http://schemas.openxmlformats.org/officeDocument/2006/relationships" xmlns:p="http://schemas.openxmlformats.org/presentationml/2006/main">
+  <p:cSld>
+    <p:spTree>
+      <p:nvGrpSpPr>
+        <p:cNvPr id="1" name=""/>
+        <p:cNvGrpSpPr/>
+        <p:nvPr/>
+      </p:nvGrpSpPr>
+      <p:grpSpPr>
+        <a:xfrm>
+          <a:off x="0" y="0"/>
+          <a:ext cx="0" cy="0"/>
+          <a:chOff x="0" y="0"/>
+          <a:chExt cx="0" cy="0"/>
+        </a:xfrm>
+      </p:grpSpPr>
+      <p:sp>
+        <p:nvSpPr>
+          <p:cNvPr id="2" name="Title 1"/>
+          <p:cNvSpPr>
+            <a:spLocks noGrp="1"/>
+          </p:cNvSpPr>
+          <p:nvPr>
+            <p:ph type="title"/>
+          </p:nvPr>
+        </p:nvSpPr>
+        <p:spPr/>
+        <p:txBody>
+          <a:bodyPr/>
+          <a:lstStyle/>
+          <a:p>
+            <a:r>
+              <a:rPr lang="en-US" dirty="0" smtClean="0"/>
+              <a:t>Contributions</a:t>
+            </a:r>
+            <a:endParaRPr lang="en-US" dirty="0"/>
+          </a:p>
+        </p:txBody>
+      </p:sp>
+      <p:pic>
+        <p:nvPicPr>
+          <p:cNvPr id="4" name="Picture 3"/>
+          <p:cNvPicPr>
+            <a:picLocks noChangeAspect="1"/>
+          </p:cNvPicPr>
+          <p:nvPr/>
+        </p:nvPicPr>
+        <p:blipFill>
+          <a:blip r:embed="rId2"/>
+          <a:stretch>
+            <a:fillRect/>
+          </a:stretch>
+        </p:blipFill>
+        <p:spPr>
+          <a:xfrm>
             <a:off x="3445073" y="1507496"/>
             <a:ext cx="7925310" cy="4918703"/>
           </a:xfrm>
@@ -4570,7 +4952,140 @@
 </p:sld>
 </file>
 
-<file path=ppt/slides/slide18.xml><?xml version="1.0" encoding="utf-8"?>
+<file path=ppt/slides/slide2.xml><?xml version="1.0" encoding="utf-8"?>
+<p:sld xmlns:a="http://schemas.openxmlformats.org/drawingml/2006/main" xmlns:r="http://schemas.openxmlformats.org/officeDocument/2006/relationships" xmlns:p="http://schemas.openxmlformats.org/presentationml/2006/main" showMasterSp="0">
+  <p:cSld>
+    <p:spTree>
+      <p:nvGrpSpPr>
+        <p:cNvPr id="1" name=""/>
+        <p:cNvGrpSpPr/>
+        <p:nvPr/>
+      </p:nvGrpSpPr>
+      <p:grpSpPr>
+        <a:xfrm>
+          <a:off x="0" y="0"/>
+          <a:ext cx="0" cy="0"/>
+          <a:chOff x="0" y="0"/>
+          <a:chExt cx="0" cy="0"/>
+        </a:xfrm>
+      </p:grpSpPr>
+      <p:sp>
+        <p:nvSpPr>
+          <p:cNvPr id="2" name="Title 1"/>
+          <p:cNvSpPr>
+            <a:spLocks noGrp="1"/>
+          </p:cNvSpPr>
+          <p:nvPr>
+            <p:ph type="title"/>
+          </p:nvPr>
+        </p:nvSpPr>
+        <p:spPr/>
+        <p:txBody>
+          <a:bodyPr/>
+          <a:lstStyle/>
+          <a:p>
+            <a:r>
+              <a:rPr lang="en-US" dirty="0" smtClean="0"/>
+              <a:t>Outline</a:t>
+            </a:r>
+            <a:endParaRPr lang="en-US" dirty="0"/>
+          </a:p>
+        </p:txBody>
+      </p:sp>
+      <p:sp>
+        <p:nvSpPr>
+          <p:cNvPr id="3" name="Content Placeholder 2"/>
+          <p:cNvSpPr>
+            <a:spLocks noGrp="1"/>
+          </p:cNvSpPr>
+          <p:nvPr>
+            <p:ph idx="1"/>
+          </p:nvPr>
+        </p:nvSpPr>
+        <p:spPr/>
+        <p:txBody>
+          <a:bodyPr/>
+          <a:lstStyle/>
+          <a:p>
+            <a:r>
+              <a:rPr lang="en-US" dirty="0" smtClean="0"/>
+              <a:t>Motivation</a:t>
+            </a:r>
+          </a:p>
+          <a:p>
+            <a:pPr lvl="1"/>
+            <a:r>
+              <a:rPr lang="en-US" dirty="0" smtClean="0"/>
+              <a:t>Artificial intelligence (AI) forecast</a:t>
+            </a:r>
+          </a:p>
+          <a:p>
+            <a:pPr lvl="1"/>
+            <a:r>
+              <a:rPr lang="en-US" dirty="0" smtClean="0"/>
+              <a:t>AI virtual assistance </a:t>
+            </a:r>
+          </a:p>
+          <a:p>
+            <a:r>
+              <a:rPr lang="en-US" dirty="0" smtClean="0"/>
+              <a:t>Literature review</a:t>
+            </a:r>
+          </a:p>
+          <a:p>
+            <a:r>
+              <a:rPr lang="en-US" dirty="0" smtClean="0"/>
+              <a:t>Challenges</a:t>
+            </a:r>
+          </a:p>
+          <a:p>
+            <a:r>
+              <a:rPr lang="en-US" dirty="0" smtClean="0"/>
+              <a:t>Objectives</a:t>
+            </a:r>
+          </a:p>
+          <a:p>
+            <a:r>
+              <a:rPr lang="en-US" dirty="0" smtClean="0"/>
+              <a:t>Methodology</a:t>
+            </a:r>
+          </a:p>
+          <a:p>
+            <a:r>
+              <a:rPr lang="en-US" dirty="0" smtClean="0"/>
+              <a:t>Study Plan</a:t>
+            </a:r>
+          </a:p>
+          <a:p>
+            <a:r>
+              <a:rPr lang="en-US" dirty="0" smtClean="0"/>
+              <a:t>Question</a:t>
+            </a:r>
+            <a:endParaRPr lang="en-US" dirty="0"/>
+          </a:p>
+        </p:txBody>
+      </p:sp>
+    </p:spTree>
+    <p:extLst>
+      <p:ext uri="{BB962C8B-B14F-4D97-AF65-F5344CB8AC3E}">
+        <p14:creationId xmlns:p14="http://schemas.microsoft.com/office/powerpoint/2010/main" val="2059971362"/>
+      </p:ext>
+    </p:extLst>
+  </p:cSld>
+  <p:clrMapOvr>
+    <a:masterClrMapping/>
+  </p:clrMapOvr>
+  <p:timing>
+    <p:tnLst>
+      <p:par>
+        <p:cTn id="1" dur="indefinite" restart="never" nodeType="tmRoot"/>
+      </p:par>
+    </p:tnLst>
+  </p:timing>
+</p:sld>
+</file>
+
+<file path=ppt/slides/slide20.xml><?xml version="1.0" encoding="utf-8"?>
 <p:sld xmlns:a="http://schemas.openxmlformats.org/drawingml/2006/main" xmlns:r="http://schemas.openxmlformats.org/officeDocument/2006/relationships" xmlns:p="http://schemas.openxmlformats.org/presentationml/2006/main">
   <p:cSld>
     <p:spTree>
@@ -4901,7 +5416,7 @@
 </p:sld>
 </file>
 
-<file path=ppt/slides/slide19.xml><?xml version="1.0" encoding="utf-8"?>
+<file path=ppt/slides/slide21.xml><?xml version="1.0" encoding="utf-8"?>
 <p:sld xmlns:a="http://schemas.openxmlformats.org/drawingml/2006/main" xmlns:r="http://schemas.openxmlformats.org/officeDocument/2006/relationships" xmlns:p="http://schemas.openxmlformats.org/presentationml/2006/main">
   <p:cSld>
     <p:spTree>
@@ -5146,140 +5661,7 @@
 </p:sld>
 </file>
 
-<file path=ppt/slides/slide2.xml><?xml version="1.0" encoding="utf-8"?>
-<p:sld xmlns:a="http://schemas.openxmlformats.org/drawingml/2006/main" xmlns:r="http://schemas.openxmlformats.org/officeDocument/2006/relationships" xmlns:p="http://schemas.openxmlformats.org/presentationml/2006/main" showMasterSp="0">
-  <p:cSld>
-    <p:spTree>
-      <p:nvGrpSpPr>
-        <p:cNvPr id="1" name=""/>
-        <p:cNvGrpSpPr/>
-        <p:nvPr/>
-      </p:nvGrpSpPr>
-      <p:grpSpPr>
-        <a:xfrm>
-          <a:off x="0" y="0"/>
-          <a:ext cx="0" cy="0"/>
-          <a:chOff x="0" y="0"/>
-          <a:chExt cx="0" cy="0"/>
-        </a:xfrm>
-      </p:grpSpPr>
-      <p:sp>
-        <p:nvSpPr>
-          <p:cNvPr id="2" name="Title 1"/>
-          <p:cNvSpPr>
-            <a:spLocks noGrp="1"/>
-          </p:cNvSpPr>
-          <p:nvPr>
-            <p:ph type="title"/>
-          </p:nvPr>
-        </p:nvSpPr>
-        <p:spPr/>
-        <p:txBody>
-          <a:bodyPr/>
-          <a:lstStyle/>
-          <a:p>
-            <a:r>
-              <a:rPr lang="en-US" dirty="0" smtClean="0"/>
-              <a:t>Outline</a:t>
-            </a:r>
-            <a:endParaRPr lang="en-US" dirty="0"/>
-          </a:p>
-        </p:txBody>
-      </p:sp>
-      <p:sp>
-        <p:nvSpPr>
-          <p:cNvPr id="3" name="Content Placeholder 2"/>
-          <p:cNvSpPr>
-            <a:spLocks noGrp="1"/>
-          </p:cNvSpPr>
-          <p:nvPr>
-            <p:ph idx="1"/>
-          </p:nvPr>
-        </p:nvSpPr>
-        <p:spPr/>
-        <p:txBody>
-          <a:bodyPr/>
-          <a:lstStyle/>
-          <a:p>
-            <a:r>
-              <a:rPr lang="en-US" dirty="0" smtClean="0"/>
-              <a:t>Motivation</a:t>
-            </a:r>
-          </a:p>
-          <a:p>
-            <a:pPr lvl="1"/>
-            <a:r>
-              <a:rPr lang="en-US" dirty="0" smtClean="0"/>
-              <a:t>Artificial intelligence (AI) forecast</a:t>
-            </a:r>
-          </a:p>
-          <a:p>
-            <a:pPr lvl="1"/>
-            <a:r>
-              <a:rPr lang="en-US" dirty="0" smtClean="0"/>
-              <a:t>AI virtual assistance </a:t>
-            </a:r>
-          </a:p>
-          <a:p>
-            <a:r>
-              <a:rPr lang="en-US" dirty="0" smtClean="0"/>
-              <a:t>Literature review</a:t>
-            </a:r>
-          </a:p>
-          <a:p>
-            <a:r>
-              <a:rPr lang="en-US" dirty="0" smtClean="0"/>
-              <a:t>Challenges</a:t>
-            </a:r>
-          </a:p>
-          <a:p>
-            <a:r>
-              <a:rPr lang="en-US" dirty="0" smtClean="0"/>
-              <a:t>Objectives</a:t>
-            </a:r>
-          </a:p>
-          <a:p>
-            <a:r>
-              <a:rPr lang="en-US" dirty="0" smtClean="0"/>
-              <a:t>Methodology</a:t>
-            </a:r>
-          </a:p>
-          <a:p>
-            <a:r>
-              <a:rPr lang="en-US" dirty="0" smtClean="0"/>
-              <a:t>Study Plan</a:t>
-            </a:r>
-          </a:p>
-          <a:p>
-            <a:r>
-              <a:rPr lang="en-US" dirty="0" smtClean="0"/>
-              <a:t>Question</a:t>
-            </a:r>
-            <a:endParaRPr lang="en-US" dirty="0"/>
-          </a:p>
-        </p:txBody>
-      </p:sp>
-    </p:spTree>
-    <p:extLst>
-      <p:ext uri="{BB962C8B-B14F-4D97-AF65-F5344CB8AC3E}">
-        <p14:creationId xmlns:p14="http://schemas.microsoft.com/office/powerpoint/2010/main" val="2059971362"/>
-      </p:ext>
-    </p:extLst>
-  </p:cSld>
-  <p:clrMapOvr>
-    <a:masterClrMapping/>
-  </p:clrMapOvr>
-  <p:timing>
-    <p:tnLst>
-      <p:par>
-        <p:cTn id="1" dur="indefinite" restart="never" nodeType="tmRoot"/>
-      </p:par>
-    </p:tnLst>
-  </p:timing>
-</p:sld>
-</file>
-
-<file path=ppt/slides/slide20.xml><?xml version="1.0" encoding="utf-8"?>
+<file path=ppt/slides/slide22.xml><?xml version="1.0" encoding="utf-8"?>
 <p:sld xmlns:a="http://schemas.openxmlformats.org/drawingml/2006/main" xmlns:r="http://schemas.openxmlformats.org/officeDocument/2006/relationships" xmlns:p="http://schemas.openxmlformats.org/presentationml/2006/main">
   <p:cSld>
     <p:spTree>
@@ -5617,7 +5999,7 @@
 </p:sld>
 </file>
 
-<file path=ppt/slides/slide21.xml><?xml version="1.0" encoding="utf-8"?>
+<file path=ppt/slides/slide23.xml><?xml version="1.0" encoding="utf-8"?>
 <p:sld xmlns:a="http://schemas.openxmlformats.org/drawingml/2006/main" xmlns:r="http://schemas.openxmlformats.org/officeDocument/2006/relationships" xmlns:p="http://schemas.openxmlformats.org/presentationml/2006/main" showMasterSp="0">
   <p:cSld>
     <p:spTree>
@@ -5827,7 +6209,7 @@
 </p:sld>
 </file>
 
-<file path=ppt/slides/slide22.xml><?xml version="1.0" encoding="utf-8"?>
+<file path=ppt/slides/slide24.xml><?xml version="1.0" encoding="utf-8"?>
 <p:sld xmlns:a="http://schemas.openxmlformats.org/drawingml/2006/main" xmlns:r="http://schemas.openxmlformats.org/officeDocument/2006/relationships" xmlns:p="http://schemas.openxmlformats.org/presentationml/2006/main" showMasterSp="0">
   <p:cSld>
     <p:spTree>
@@ -6028,7 +6410,7 @@
 </p:sld>
 </file>
 
-<file path=ppt/slides/slide23.xml><?xml version="1.0" encoding="utf-8"?>
+<file path=ppt/slides/slide25.xml><?xml version="1.0" encoding="utf-8"?>
 <p:sld xmlns:a="http://schemas.openxmlformats.org/drawingml/2006/main" xmlns:r="http://schemas.openxmlformats.org/officeDocument/2006/relationships" xmlns:p="http://schemas.openxmlformats.org/presentationml/2006/main" showMasterSp="0">
   <p:cSld>
     <p:bg>
@@ -7525,7 +7907,7 @@
 </p:sld>
 </file>
 
-<file path=ppt/slides/slide24.xml><?xml version="1.0" encoding="utf-8"?>
+<file path=ppt/slides/slide26.xml><?xml version="1.0" encoding="utf-8"?>
 <p:sld xmlns:a="http://schemas.openxmlformats.org/drawingml/2006/main" xmlns:r="http://schemas.openxmlformats.org/officeDocument/2006/relationships" xmlns:p="http://schemas.openxmlformats.org/presentationml/2006/main" showMasterSp="0">
   <p:cSld>
     <p:spTree>
@@ -7615,7 +7997,7 @@
 </p:sld>
 </file>
 
-<file path=ppt/slides/slide25.xml><?xml version="1.0" encoding="utf-8"?>
+<file path=ppt/slides/slide27.xml><?xml version="1.0" encoding="utf-8"?>
 <p:sld xmlns:a="http://schemas.openxmlformats.org/drawingml/2006/main" xmlns:r="http://schemas.openxmlformats.org/officeDocument/2006/relationships" xmlns:p="http://schemas.openxmlformats.org/presentationml/2006/main">
   <p:cSld>
     <p:spTree>
@@ -7836,6 +8218,13 @@
   <p:clrMapOvr>
     <a:masterClrMapping/>
   </p:clrMapOvr>
+  <p:timing>
+    <p:tnLst>
+      <p:par>
+        <p:cTn id="1" dur="indefinite" restart="never" nodeType="tmRoot"/>
+      </p:par>
+    </p:tnLst>
+  </p:timing>
 </p:sld>
 </file>
 
@@ -9332,7 +9721,7 @@
         </p:spPr>
         <p:txBody>
           <a:bodyPr vert="horz" lIns="91440" tIns="45720" rIns="91440" bIns="45720" rtlCol="0">
-            <a:normAutofit fontScale="70000" lnSpcReduction="20000"/>
+            <a:normAutofit/>
           </a:bodyPr>
           <a:lstStyle>
             <a:lvl1pPr marL="228600" indent="-228600" algn="l" defTabSz="914400" rtl="0" eaLnBrk="1" latinLnBrk="0" hangingPunct="1">
@@ -9553,102 +9942,7 @@
                 <a:spcPct val="150000"/>
               </a:lnSpc>
             </a:pPr>
-            <a:r>
-              <a:rPr lang="en-US" sz="1800" dirty="0" smtClean="0"/>
-              <a:t>Show excellent classification of image style </a:t>
-            </a:r>
-            <a:r>
-              <a:rPr lang="en-US" sz="1800" dirty="0"/>
-              <a:t>visual style, including photographic techniques (“Macro,” “HDR”), composition styles (“Minimal,” “Geometric”), moods (“Serene,” “Melancholy”), </a:t>
-            </a:r>
-            <a:r>
-              <a:rPr lang="en-US" sz="1800" dirty="0" smtClean="0"/>
-              <a:t>genres (“</a:t>
-            </a:r>
-            <a:r>
-              <a:rPr lang="en-US" sz="1800" dirty="0"/>
-              <a:t>Vintage,” “Romantic,” “Horror”), and types of scenes (“Hazy,” “Sunny</a:t>
-            </a:r>
-            <a:r>
-              <a:rPr lang="en-US" sz="1800" dirty="0" smtClean="0"/>
-              <a:t>”) [12] by using CNN</a:t>
-            </a:r>
-          </a:p>
-          <a:p>
-            <a:pPr algn="just">
-              <a:lnSpc>
-                <a:spcPct val="150000"/>
-              </a:lnSpc>
-            </a:pPr>
-            <a:r>
-              <a:rPr lang="en-US" sz="1800" dirty="0" smtClean="0"/>
-              <a:t>Customized expression recognition for performance-driven cutout character animation[13] by using deep  convolutional neural network</a:t>
-            </a:r>
-          </a:p>
-          <a:p>
-            <a:pPr algn="just">
-              <a:lnSpc>
-                <a:spcPct val="150000"/>
-              </a:lnSpc>
-            </a:pPr>
-            <a:r>
-              <a:rPr lang="en-US" sz="1800" dirty="0" err="1" smtClean="0"/>
-              <a:t>ArtWork</a:t>
-            </a:r>
-            <a:r>
-              <a:rPr lang="en-US" sz="1800" dirty="0" smtClean="0"/>
-              <a:t> recognition in 360 degree [14] by </a:t>
-            </a:r>
-            <a:r>
-              <a:rPr lang="en-US" sz="1900" dirty="0"/>
-              <a:t>using a 32- </a:t>
-            </a:r>
-            <a:r>
-              <a:rPr lang="en-US" sz="1900" dirty="0" err="1"/>
-              <a:t>hedron</a:t>
-            </a:r>
-            <a:r>
-              <a:rPr lang="en-US" sz="1900" dirty="0"/>
-              <a:t> based rectilinear projection and the well-known scale invariant feature </a:t>
-            </a:r>
-            <a:r>
-              <a:rPr lang="en-US" sz="1900" dirty="0" smtClean="0"/>
-              <a:t>transform.</a:t>
-            </a:r>
-          </a:p>
-          <a:p>
-            <a:pPr algn="just">
-              <a:lnSpc>
-                <a:spcPct val="150000"/>
-              </a:lnSpc>
-            </a:pPr>
-            <a:r>
-              <a:rPr lang="en-US" sz="1900" dirty="0" smtClean="0"/>
-              <a:t>Virtual restoration an object by using crack detection and </a:t>
-            </a:r>
-            <a:r>
-              <a:rPr lang="en-US" sz="1900" dirty="0" err="1" smtClean="0"/>
-              <a:t>inpainting</a:t>
-            </a:r>
-            <a:r>
-              <a:rPr lang="en-US" sz="1900" dirty="0"/>
-              <a:t> </a:t>
-            </a:r>
-            <a:r>
-              <a:rPr lang="en-US" sz="1900" dirty="0" smtClean="0"/>
-              <a:t>[15]</a:t>
-            </a:r>
-          </a:p>
-          <a:p>
-            <a:pPr algn="just">
-              <a:lnSpc>
-                <a:spcPct val="150000"/>
-              </a:lnSpc>
-            </a:pPr>
-            <a:r>
-              <a:rPr lang="en-US" sz="1900" dirty="0" smtClean="0"/>
-              <a:t>3D Pose estimation [16]</a:t>
-            </a:r>
+            <a:endParaRPr lang="en-US" sz="1900" dirty="0" smtClean="0"/>
           </a:p>
           <a:p>
             <a:pPr algn="just">
@@ -9717,6 +10011,151 @@
 </file>
 
 <file path=ppt/slides/slide8.xml><?xml version="1.0" encoding="utf-8"?>
+<p:sld xmlns:a="http://schemas.openxmlformats.org/drawingml/2006/main" xmlns:r="http://schemas.openxmlformats.org/officeDocument/2006/relationships" xmlns:p="http://schemas.openxmlformats.org/presentationml/2006/main">
+  <p:cSld>
+    <p:spTree>
+      <p:nvGrpSpPr>
+        <p:cNvPr id="1" name=""/>
+        <p:cNvGrpSpPr/>
+        <p:nvPr/>
+      </p:nvGrpSpPr>
+      <p:grpSpPr>
+        <a:xfrm>
+          <a:off x="0" y="0"/>
+          <a:ext cx="0" cy="0"/>
+          <a:chOff x="0" y="0"/>
+          <a:chExt cx="0" cy="0"/>
+        </a:xfrm>
+      </p:grpSpPr>
+      <p:sp>
+        <p:nvSpPr>
+          <p:cNvPr id="2" name="Title 1"/>
+          <p:cNvSpPr>
+            <a:spLocks noGrp="1"/>
+          </p:cNvSpPr>
+          <p:nvPr>
+            <p:ph type="title"/>
+          </p:nvPr>
+        </p:nvSpPr>
+        <p:spPr/>
+        <p:txBody>
+          <a:bodyPr/>
+          <a:lstStyle/>
+          <a:p>
+            <a:r>
+              <a:rPr lang="en-US" dirty="0"/>
+              <a:t>Literature review</a:t>
+            </a:r>
+          </a:p>
+        </p:txBody>
+      </p:sp>
+      <p:sp>
+        <p:nvSpPr>
+          <p:cNvPr id="3" name="Content Placeholder 2"/>
+          <p:cNvSpPr>
+            <a:spLocks noGrp="1"/>
+          </p:cNvSpPr>
+          <p:nvPr>
+            <p:ph idx="1"/>
+          </p:nvPr>
+        </p:nvSpPr>
+        <p:spPr/>
+        <p:txBody>
+          <a:bodyPr>
+            <a:noAutofit/>
+          </a:bodyPr>
+          <a:lstStyle/>
+          <a:p>
+            <a:pPr algn="just">
+              <a:lnSpc>
+                <a:spcPct val="150000"/>
+              </a:lnSpc>
+            </a:pPr>
+            <a:r>
+              <a:rPr lang="en-US" sz="1800" dirty="0"/>
+              <a:t>Show excellent classification of image style visual style, including photographic techniques (“Macro,” “HDR”), composition styles (“Minimal,” “Geometric”), moods (“Serene,” “Melancholy”), genres (“Vintage,” “Romantic,” “Horror”), and types of scenes (“Hazy,” “Sunny”) [12] by using CNN</a:t>
+            </a:r>
+          </a:p>
+          <a:p>
+            <a:pPr algn="just">
+              <a:lnSpc>
+                <a:spcPct val="150000"/>
+              </a:lnSpc>
+            </a:pPr>
+            <a:r>
+              <a:rPr lang="en-US" sz="1800" dirty="0"/>
+              <a:t>Customized expression recognition for performance-driven cutout character animation[13] by using deep  convolutional neural network</a:t>
+            </a:r>
+          </a:p>
+          <a:p>
+            <a:pPr algn="just">
+              <a:lnSpc>
+                <a:spcPct val="150000"/>
+              </a:lnSpc>
+            </a:pPr>
+            <a:r>
+              <a:rPr lang="en-US" sz="1800" dirty="0" err="1"/>
+              <a:t>ArtWork</a:t>
+            </a:r>
+            <a:r>
+              <a:rPr lang="en-US" sz="1800" dirty="0"/>
+              <a:t> recognition in 360 degree [14] by using a 32- </a:t>
+            </a:r>
+            <a:r>
+              <a:rPr lang="en-US" sz="1800" dirty="0" err="1"/>
+              <a:t>hedron</a:t>
+            </a:r>
+            <a:r>
+              <a:rPr lang="en-US" sz="1800" dirty="0"/>
+              <a:t> based rectilinear projection and the well-known scale invariant feature transform.</a:t>
+            </a:r>
+          </a:p>
+          <a:p>
+            <a:pPr algn="just">
+              <a:lnSpc>
+                <a:spcPct val="150000"/>
+              </a:lnSpc>
+            </a:pPr>
+            <a:r>
+              <a:rPr lang="en-US" sz="1800" dirty="0"/>
+              <a:t>Virtual restoration an object by using crack detection and </a:t>
+            </a:r>
+            <a:r>
+              <a:rPr lang="en-US" sz="1800" dirty="0" err="1"/>
+              <a:t>inpainting</a:t>
+            </a:r>
+            <a:r>
+              <a:rPr lang="en-US" sz="1800" dirty="0"/>
+              <a:t> [15]</a:t>
+            </a:r>
+          </a:p>
+          <a:p>
+            <a:pPr algn="just">
+              <a:lnSpc>
+                <a:spcPct val="150000"/>
+              </a:lnSpc>
+            </a:pPr>
+            <a:r>
+              <a:rPr lang="en-US" sz="1800" dirty="0"/>
+              <a:t>3D Pose estimation [16]</a:t>
+            </a:r>
+          </a:p>
+        </p:txBody>
+      </p:sp>
+    </p:spTree>
+    <p:extLst>
+      <p:ext uri="{BB962C8B-B14F-4D97-AF65-F5344CB8AC3E}">
+        <p14:creationId xmlns:p14="http://schemas.microsoft.com/office/powerpoint/2010/main" val="1313534822"/>
+      </p:ext>
+    </p:extLst>
+  </p:cSld>
+  <p:clrMapOvr>
+    <a:masterClrMapping/>
+  </p:clrMapOvr>
+</p:sld>
+</file>
+
+<file path=ppt/slides/slide9.xml><?xml version="1.0" encoding="utf-8"?>
 <p:sld xmlns:a="http://schemas.openxmlformats.org/drawingml/2006/main" xmlns:r="http://schemas.openxmlformats.org/officeDocument/2006/relationships" xmlns:p="http://schemas.openxmlformats.org/presentationml/2006/main" showMasterSp="0">
   <p:cSld>
     <p:spTree>
@@ -10105,308 +10544,13 @@
   <p:clrMapOvr>
     <a:masterClrMapping/>
   </p:clrMapOvr>
-</p:sld>
-</file>
-
-<file path=ppt/slides/slide9.xml><?xml version="1.0" encoding="utf-8"?>
-<p:sld xmlns:a="http://schemas.openxmlformats.org/drawingml/2006/main" xmlns:r="http://schemas.openxmlformats.org/officeDocument/2006/relationships" xmlns:p="http://schemas.openxmlformats.org/presentationml/2006/main">
-  <p:cSld>
-    <p:spTree>
-      <p:nvGrpSpPr>
-        <p:cNvPr id="1" name=""/>
-        <p:cNvGrpSpPr/>
-        <p:nvPr/>
-      </p:nvGrpSpPr>
-      <p:grpSpPr>
-        <a:xfrm>
-          <a:off x="0" y="0"/>
-          <a:ext cx="0" cy="0"/>
-          <a:chOff x="0" y="0"/>
-          <a:chExt cx="0" cy="0"/>
-        </a:xfrm>
-      </p:grpSpPr>
-      <p:sp>
-        <p:nvSpPr>
-          <p:cNvPr id="2" name="Title 1"/>
-          <p:cNvSpPr>
-            <a:spLocks noGrp="1"/>
-          </p:cNvSpPr>
-          <p:nvPr>
-            <p:ph type="title"/>
-          </p:nvPr>
-        </p:nvSpPr>
-        <p:spPr/>
-        <p:txBody>
-          <a:bodyPr/>
-          <a:lstStyle/>
-          <a:p>
-            <a:r>
-              <a:rPr lang="en-US" dirty="0"/>
-              <a:t>Literature review</a:t>
-            </a:r>
-          </a:p>
-        </p:txBody>
-      </p:sp>
-      <p:sp>
-        <p:nvSpPr>
-          <p:cNvPr id="4" name="Content Placeholder 2"/>
-          <p:cNvSpPr>
-            <a:spLocks noGrp="1"/>
-          </p:cNvSpPr>
-          <p:nvPr>
-            <p:ph idx="1"/>
-          </p:nvPr>
-        </p:nvSpPr>
-        <p:spPr>
-          <a:xfrm>
-            <a:off x="3095897" y="1841862"/>
-            <a:ext cx="8623663" cy="4825638"/>
-          </a:xfrm>
-        </p:spPr>
-        <p:txBody>
-          <a:bodyPr>
-            <a:noAutofit/>
-          </a:bodyPr>
-          <a:lstStyle/>
-          <a:p>
-            <a:r>
-              <a:rPr lang="en-US" sz="1100" dirty="0"/>
-              <a:t>[</a:t>
-            </a:r>
-            <a:r>
-              <a:rPr lang="en-US" sz="1100" dirty="0" smtClean="0"/>
-              <a:t>12] S. </a:t>
-            </a:r>
-            <a:r>
-              <a:rPr lang="en-US" sz="1100" dirty="0" err="1" smtClean="0"/>
-              <a:t>Karayev</a:t>
-            </a:r>
-            <a:r>
-              <a:rPr lang="en-US" sz="1100" dirty="0" smtClean="0"/>
-              <a:t>, M. </a:t>
-            </a:r>
-            <a:r>
-              <a:rPr lang="en-US" sz="1100" dirty="0" err="1" smtClean="0"/>
-              <a:t>Trentacoste</a:t>
-            </a:r>
-            <a:r>
-              <a:rPr lang="en-US" sz="1100" dirty="0" smtClean="0"/>
-              <a:t>, H. Han, A. </a:t>
-            </a:r>
-            <a:r>
-              <a:rPr lang="en-US" sz="1100" dirty="0" err="1" smtClean="0"/>
-              <a:t>Agarwala</a:t>
-            </a:r>
-            <a:r>
-              <a:rPr lang="en-US" sz="1100" dirty="0" smtClean="0"/>
-              <a:t>, T. Darrell, A. </a:t>
-            </a:r>
-            <a:r>
-              <a:rPr lang="en-US" sz="1100" dirty="0" err="1" smtClean="0"/>
-              <a:t>Hertzmann</a:t>
-            </a:r>
-            <a:r>
-              <a:rPr lang="en-US" sz="1100" dirty="0" smtClean="0"/>
-              <a:t>, H. </a:t>
-            </a:r>
-            <a:r>
-              <a:rPr lang="en-US" sz="1100" dirty="0" err="1" smtClean="0"/>
-              <a:t>Winnemoeller</a:t>
-            </a:r>
-            <a:r>
-              <a:rPr lang="en-US" sz="1100" dirty="0" smtClean="0"/>
-              <a:t> , “ Recognizing </a:t>
-            </a:r>
-            <a:r>
-              <a:rPr lang="en-US" sz="1100" dirty="0"/>
-              <a:t>Image style”, </a:t>
-            </a:r>
-            <a:r>
-              <a:rPr lang="en-US" sz="1100" dirty="0">
-                <a:hlinkClick r:id="rId2"/>
-              </a:rPr>
-              <a:t>https://</a:t>
-            </a:r>
-            <a:r>
-              <a:rPr lang="en-US" sz="1100" dirty="0" smtClean="0">
-                <a:hlinkClick r:id="rId2"/>
-              </a:rPr>
-              <a:t>sergeykarayev.com/files/1311.3715v3.pdf</a:t>
-            </a:r>
-            <a:endParaRPr lang="en-US" sz="1100" dirty="0" smtClean="0"/>
-          </a:p>
-          <a:p>
-            <a:r>
-              <a:rPr lang="en-US" sz="1100" dirty="0" smtClean="0"/>
-              <a:t>[13] X. Yu, J. Yang, L. Luo, W. Li, J. Brandt, D. </a:t>
-            </a:r>
-            <a:r>
-              <a:rPr lang="en-US" sz="1100" dirty="0" err="1" smtClean="0"/>
-              <a:t>Metaxas,”Customized</a:t>
-            </a:r>
-            <a:r>
-              <a:rPr lang="en-US" sz="1100" dirty="0" smtClean="0"/>
-              <a:t> expression recognition for performance-driven cutout character animation”, in Applications of Computer Vision(WACV), 2016, IEEE Winter Conference</a:t>
-            </a:r>
-          </a:p>
-          <a:p>
-            <a:r>
-              <a:rPr lang="en-US" sz="1100" dirty="0" smtClean="0"/>
-              <a:t>[14] X. </a:t>
-            </a:r>
-            <a:r>
-              <a:rPr lang="en-US" sz="1100" dirty="0" err="1" smtClean="0"/>
-              <a:t>Jin</a:t>
-            </a:r>
-            <a:r>
-              <a:rPr lang="en-US" sz="1100" dirty="0" smtClean="0"/>
-              <a:t>, J. Kim</a:t>
-            </a:r>
-            <a:r>
-              <a:rPr lang="en-US" sz="1100" dirty="0"/>
-              <a:t>, “</a:t>
-            </a:r>
-            <a:r>
-              <a:rPr lang="en-US" sz="1100" dirty="0" err="1"/>
-              <a:t>ArtWork</a:t>
-            </a:r>
-            <a:r>
-              <a:rPr lang="en-US" sz="1100" dirty="0"/>
-              <a:t> Recognition in 360-degree Image using 32- </a:t>
-            </a:r>
-            <a:r>
-              <a:rPr lang="en-US" sz="1100" dirty="0" err="1"/>
-              <a:t>hedron</a:t>
-            </a:r>
-            <a:r>
-              <a:rPr lang="en-US" sz="1100" dirty="0"/>
-              <a:t> based Rectilinear Projection and Scale Invariant Feature Transform </a:t>
-            </a:r>
-            <a:r>
-              <a:rPr lang="en-US" sz="1100" dirty="0" smtClean="0"/>
-              <a:t>“, in ICEICT, IEEE </a:t>
-            </a:r>
-            <a:r>
-              <a:rPr lang="en-US" sz="1100" dirty="0" err="1" smtClean="0"/>
-              <a:t>Int</a:t>
-            </a:r>
-            <a:r>
-              <a:rPr lang="en-US" sz="1100" dirty="0" smtClean="0"/>
-              <a:t> </a:t>
-            </a:r>
-            <a:r>
-              <a:rPr lang="en-US" sz="1100" dirty="0" err="1" smtClean="0"/>
-              <a:t>Conf</a:t>
-            </a:r>
-            <a:r>
-              <a:rPr lang="en-US" sz="1100" dirty="0" smtClean="0"/>
-              <a:t>, 2017, pp 356-359</a:t>
-            </a:r>
-          </a:p>
-          <a:p>
-            <a:r>
-              <a:rPr lang="en-US" sz="1100" dirty="0" smtClean="0"/>
-              <a:t>[15] T. </a:t>
-            </a:r>
-            <a:r>
-              <a:rPr lang="en-US" sz="1100" dirty="0" err="1" smtClean="0"/>
-              <a:t>Ruzic</a:t>
-            </a:r>
-            <a:r>
-              <a:rPr lang="en-US" sz="1100" dirty="0" smtClean="0"/>
-              <a:t>, B. </a:t>
-            </a:r>
-            <a:r>
-              <a:rPr lang="en-US" sz="1100" dirty="0" err="1" smtClean="0"/>
-              <a:t>cornelis</a:t>
-            </a:r>
-            <a:r>
-              <a:rPr lang="en-US" sz="1100" dirty="0" smtClean="0"/>
-              <a:t>, L. </a:t>
-            </a:r>
-            <a:r>
-              <a:rPr lang="en-US" sz="1100" dirty="0" err="1" smtClean="0"/>
-              <a:t>Platisa</a:t>
-            </a:r>
-            <a:r>
-              <a:rPr lang="en-US" sz="1100" dirty="0" smtClean="0"/>
-              <a:t>, A. </a:t>
-            </a:r>
-            <a:r>
-              <a:rPr lang="en-US" sz="1100" dirty="0" err="1" smtClean="0"/>
-              <a:t>Pizurica</a:t>
-            </a:r>
-            <a:r>
-              <a:rPr lang="en-US" sz="1100" dirty="0" smtClean="0"/>
-              <a:t>, A. Dooms, W. Philips, M. Martens, M. D. </a:t>
-            </a:r>
-            <a:r>
-              <a:rPr lang="en-US" sz="1100" dirty="0" err="1" smtClean="0"/>
-              <a:t>Mey</a:t>
-            </a:r>
-            <a:r>
-              <a:rPr lang="en-US" sz="1100" dirty="0" smtClean="0"/>
-              <a:t>, I. </a:t>
-            </a:r>
-            <a:r>
-              <a:rPr lang="en-US" sz="1100" dirty="0" err="1" smtClean="0"/>
-              <a:t>Daubechies</a:t>
-            </a:r>
-            <a:r>
-              <a:rPr lang="en-US" sz="1100" dirty="0" smtClean="0"/>
-              <a:t>, “Virtual Restoration of the Ghent Altarpiece Using Crack Detection and </a:t>
-            </a:r>
-            <a:r>
-              <a:rPr lang="en-US" sz="1100" dirty="0" err="1" smtClean="0"/>
-              <a:t>Inpainting</a:t>
-            </a:r>
-            <a:r>
-              <a:rPr lang="en-US" sz="1100" dirty="0" smtClean="0"/>
-              <a:t>”, in ACIVS 2011, pp 417-428.</a:t>
-            </a:r>
-          </a:p>
-          <a:p>
-            <a:r>
-              <a:rPr lang="en-US" sz="1100" dirty="0" smtClean="0"/>
-              <a:t>[16] P. </a:t>
-            </a:r>
-            <a:r>
-              <a:rPr lang="en-US" sz="1100" dirty="0" err="1" smtClean="0"/>
-              <a:t>Wohlhart</a:t>
-            </a:r>
-            <a:r>
-              <a:rPr lang="en-US" sz="1100" dirty="0" smtClean="0"/>
-              <a:t> and V. </a:t>
-            </a:r>
-            <a:r>
-              <a:rPr lang="en-US" sz="1100" dirty="0" err="1" smtClean="0"/>
-              <a:t>Lepetit</a:t>
-            </a:r>
-            <a:r>
-              <a:rPr lang="en-US" sz="1100" dirty="0" smtClean="0"/>
-              <a:t>, “Learning descriptors for object recognition and 3D pose estimation”, in CVPR, </a:t>
-            </a:r>
-            <a:r>
-              <a:rPr lang="en-US" sz="1100" smtClean="0"/>
-              <a:t>IEEE Conference, 2015, pp 3109-3118</a:t>
-            </a:r>
-            <a:endParaRPr lang="en-US" sz="1100" dirty="0" smtClean="0"/>
-          </a:p>
-          <a:p>
-            <a:endParaRPr lang="en-US" sz="1100" dirty="0"/>
-          </a:p>
-        </p:txBody>
-      </p:sp>
-    </p:spTree>
-    <p:extLst>
-      <p:ext uri="{BB962C8B-B14F-4D97-AF65-F5344CB8AC3E}">
-        <p14:creationId xmlns:p14="http://schemas.microsoft.com/office/powerpoint/2010/main" val="1440396747"/>
-      </p:ext>
-    </p:extLst>
-  </p:cSld>
-  <p:clrMapOvr>
-    <a:masterClrMapping/>
-  </p:clrMapOvr>
+  <p:timing>
+    <p:tnLst>
+      <p:par>
+        <p:cTn id="1" dur="indefinite" restart="never" nodeType="tmRoot"/>
+      </p:par>
+    </p:tnLst>
+  </p:timing>
 </p:sld>
 </file>
 
@@ -10665,7 +10809,7 @@
   <a:extraClrSchemeLst/>
   <a:extLst>
     <a:ext uri="{05A4C25C-085E-4340-85A3-A5531E510DB2}">
-      <thm15:themeFamily xmlns:thm15="http://schemas.microsoft.com/office/thememl/2012/main" name="Presentation8" id="{DABEB7E4-FBD7-C94F-9D7C-453E867EFB64}" vid="{9B141126-495E-6545-A756-93C48DDBAC65}"/>
+      <thm15:themeFamily xmlns:thm15="http://schemas.microsoft.com/office/thememl/2012/main" xmlns="" name="Presentation8" id="{DABEB7E4-FBD7-C94F-9D7C-453E867EFB64}" vid="{9B141126-495E-6545-A756-93C48DDBAC65}"/>
     </a:ext>
   </a:extLst>
 </a:theme>

</xml_diff>

<commit_message>
update solution for VR
</commit_message>
<xml_diff>
--- a/DGA1031/What is it.pptx
+++ b/DGA1031/What is it.pptx
@@ -280,7 +280,7 @@
           <a:p>
             <a:fld id="{276D79ED-3FA7-4EF8-964B-EB8BCFAB02F8}" type="datetimeFigureOut">
               <a:rPr lang="en-US" smtClean="0"/>
-              <a:t>2/22/2018</a:t>
+              <a:t>2/23/2018</a:t>
             </a:fld>
             <a:endParaRPr lang="en-US"/>
           </a:p>
@@ -450,7 +450,7 @@
           <a:p>
             <a:fld id="{276D79ED-3FA7-4EF8-964B-EB8BCFAB02F8}" type="datetimeFigureOut">
               <a:rPr lang="en-US" smtClean="0"/>
-              <a:t>2/22/2018</a:t>
+              <a:t>2/23/2018</a:t>
             </a:fld>
             <a:endParaRPr lang="en-US"/>
           </a:p>
@@ -698,7 +698,7 @@
           <a:p>
             <a:fld id="{276D79ED-3FA7-4EF8-964B-EB8BCFAB02F8}" type="datetimeFigureOut">
               <a:rPr lang="en-US" smtClean="0"/>
-              <a:t>2/22/2018</a:t>
+              <a:t>2/23/2018</a:t>
             </a:fld>
             <a:endParaRPr lang="en-US"/>
           </a:p>
@@ -930,7 +930,7 @@
           <a:p>
             <a:fld id="{276D79ED-3FA7-4EF8-964B-EB8BCFAB02F8}" type="datetimeFigureOut">
               <a:rPr lang="en-US" smtClean="0"/>
-              <a:t>2/22/2018</a:t>
+              <a:t>2/23/2018</a:t>
             </a:fld>
             <a:endParaRPr lang="en-US"/>
           </a:p>
@@ -1297,7 +1297,7 @@
           <a:p>
             <a:fld id="{276D79ED-3FA7-4EF8-964B-EB8BCFAB02F8}" type="datetimeFigureOut">
               <a:rPr lang="en-US" smtClean="0"/>
-              <a:t>2/22/2018</a:t>
+              <a:t>2/23/2018</a:t>
             </a:fld>
             <a:endParaRPr lang="en-US"/>
           </a:p>
@@ -1415,7 +1415,7 @@
           <a:p>
             <a:fld id="{276D79ED-3FA7-4EF8-964B-EB8BCFAB02F8}" type="datetimeFigureOut">
               <a:rPr lang="en-US" smtClean="0"/>
-              <a:t>2/22/2018</a:t>
+              <a:t>2/23/2018</a:t>
             </a:fld>
             <a:endParaRPr lang="en-US"/>
           </a:p>
@@ -1510,7 +1510,7 @@
           <a:p>
             <a:fld id="{276D79ED-3FA7-4EF8-964B-EB8BCFAB02F8}" type="datetimeFigureOut">
               <a:rPr lang="en-US" smtClean="0"/>
-              <a:t>2/22/2018</a:t>
+              <a:t>2/23/2018</a:t>
             </a:fld>
             <a:endParaRPr lang="en-US"/>
           </a:p>
@@ -1787,7 +1787,7 @@
           <a:p>
             <a:fld id="{276D79ED-3FA7-4EF8-964B-EB8BCFAB02F8}" type="datetimeFigureOut">
               <a:rPr lang="en-US" smtClean="0"/>
-              <a:t>2/22/2018</a:t>
+              <a:t>2/23/2018</a:t>
             </a:fld>
             <a:endParaRPr lang="en-US"/>
           </a:p>
@@ -2044,7 +2044,7 @@
           <a:p>
             <a:fld id="{276D79ED-3FA7-4EF8-964B-EB8BCFAB02F8}" type="datetimeFigureOut">
               <a:rPr lang="en-US" smtClean="0"/>
-              <a:t>2/22/2018</a:t>
+              <a:t>2/23/2018</a:t>
             </a:fld>
             <a:endParaRPr lang="en-US"/>
           </a:p>
@@ -2265,7 +2265,7 @@
           <a:p>
             <a:fld id="{276D79ED-3FA7-4EF8-964B-EB8BCFAB02F8}" type="datetimeFigureOut">
               <a:rPr lang="en-US" smtClean="0"/>
-              <a:t>2/22/2018</a:t>
+              <a:t>2/23/2018</a:t>
             </a:fld>
             <a:endParaRPr lang="en-US"/>
           </a:p>
@@ -5367,7 +5367,7 @@
         <p:spPr>
           <a:xfrm>
             <a:off x="2924270" y="1566250"/>
-            <a:ext cx="4330338" cy="3340727"/>
+            <a:ext cx="4330338" cy="3887199"/>
           </a:xfrm>
           <a:prstGeom prst="roundRect">
             <a:avLst/>
@@ -5417,8 +5417,27 @@
             </a:pPr>
             <a:r>
               <a:rPr lang="en-US" dirty="0" smtClean="0"/>
-              <a:t>Evaluate and estimate the accuracy of the  result</a:t>
-            </a:r>
+              <a:t>Evaluate and estimate the accuracy of the  </a:t>
+            </a:r>
+            <a:r>
+              <a:rPr lang="en-US" dirty="0" smtClean="0"/>
+              <a:t>result</a:t>
+            </a:r>
+          </a:p>
+          <a:p>
+            <a:pPr marL="285750" indent="-285750">
+              <a:buFontTx/>
+              <a:buChar char="-"/>
+            </a:pPr>
+            <a:r>
+              <a:rPr lang="en-US" dirty="0" smtClean="0"/>
+              <a:t>Generate </a:t>
+            </a:r>
+            <a:r>
+              <a:rPr lang="en-US" smtClean="0"/>
+              <a:t>the holographic item</a:t>
+            </a:r>
+            <a:endParaRPr lang="en-US" dirty="0" smtClean="0"/>
           </a:p>
           <a:p>
             <a:pPr marL="285750" indent="-285750">

</xml_diff>